<commit_message>
Update Data Analysis & Visualisations of IPL.pptx
</commit_message>
<xml_diff>
--- a/Data Analysis & Visualisations of IPL.pptx
+++ b/Data Analysis & Visualisations of IPL.pptx
@@ -8,6 +8,18 @@
     <p:sldId id="256" r:id="rId2"/>
     <p:sldId id="257" r:id="rId3"/>
     <p:sldId id="258" r:id="rId4"/>
+    <p:sldId id="259" r:id="rId5"/>
+    <p:sldId id="262" r:id="rId6"/>
+    <p:sldId id="260" r:id="rId7"/>
+    <p:sldId id="261" r:id="rId8"/>
+    <p:sldId id="263" r:id="rId9"/>
+    <p:sldId id="264" r:id="rId10"/>
+    <p:sldId id="265" r:id="rId11"/>
+    <p:sldId id="266" r:id="rId12"/>
+    <p:sldId id="267" r:id="rId13"/>
+    <p:sldId id="268" r:id="rId14"/>
+    <p:sldId id="269" r:id="rId15"/>
+    <p:sldId id="270" r:id="rId16"/>
   </p:sldIdLst>
   <p:sldSz cx="12192000" cy="6858000"/>
   <p:notesSz cx="6858000" cy="9144000"/>
@@ -4159,6 +4171,1528 @@
 </p:sld>
 </file>
 
+<file path=ppt/slides/slide10.xml><?xml version="1.0" encoding="utf-8"?>
+<p:sld xmlns:a="http://schemas.openxmlformats.org/drawingml/2006/main" xmlns:r="http://schemas.openxmlformats.org/officeDocument/2006/relationships" xmlns:p="http://schemas.openxmlformats.org/presentationml/2006/main">
+  <p:cSld>
+    <p:bg>
+      <p:bgPr>
+        <a:solidFill>
+          <a:schemeClr val="bg2"/>
+        </a:solidFill>
+        <a:effectLst/>
+      </p:bgPr>
+    </p:bg>
+    <p:spTree>
+      <p:nvGrpSpPr>
+        <p:cNvPr id="1" name=""/>
+        <p:cNvGrpSpPr/>
+        <p:nvPr/>
+      </p:nvGrpSpPr>
+      <p:grpSpPr>
+        <a:xfrm>
+          <a:off x="0" y="0"/>
+          <a:ext cx="0" cy="0"/>
+          <a:chOff x="0" y="0"/>
+          <a:chExt cx="0" cy="0"/>
+        </a:xfrm>
+      </p:grpSpPr>
+      <p:sp useBgFill="1">
+        <p:nvSpPr>
+          <p:cNvPr id="12" name="Rectangle 11">
+            <a:extLst>
+              <a:ext uri="{FF2B5EF4-FFF2-40B4-BE49-F238E27FC236}">
+                <a16:creationId xmlns:a16="http://schemas.microsoft.com/office/drawing/2014/main" id="{1D868099-6145-4BC0-A5EA-74BEF1776BA9}"/>
+              </a:ext>
+              <a:ext uri="{C183D7F6-B498-43B3-948B-1728B52AA6E4}">
+                <adec:decorative xmlns:adec="http://schemas.microsoft.com/office/drawing/2017/decorative" val="1"/>
+              </a:ext>
+            </a:extLst>
+          </p:cNvPr>
+          <p:cNvSpPr>
+            <a:spLocks noGrp="1" noRot="1" noChangeAspect="1" noMove="1" noResize="1" noEditPoints="1" noAdjustHandles="1" noChangeArrowheads="1" noChangeShapeType="1" noTextEdit="1"/>
+          </p:cNvSpPr>
+          <p:nvPr>
+            <p:extLst>
+              <p:ext uri="{386F3935-93C4-4BCD-93E2-E3B085C9AB24}">
+                <p16:designElem xmlns:p16="http://schemas.microsoft.com/office/powerpoint/2015/main" val="1"/>
+              </p:ext>
+            </p:extLst>
+          </p:nvPr>
+        </p:nvSpPr>
+        <p:spPr>
+          <a:xfrm>
+            <a:off x="0" y="0"/>
+            <a:ext cx="12192000" cy="6858000"/>
+          </a:xfrm>
+          <a:prstGeom prst="rect">
+            <a:avLst/>
+          </a:prstGeom>
+          <a:ln>
+            <a:noFill/>
+          </a:ln>
+        </p:spPr>
+        <p:style>
+          <a:lnRef idx="2">
+            <a:schemeClr val="accent1">
+              <a:shade val="50000"/>
+            </a:schemeClr>
+          </a:lnRef>
+          <a:fillRef idx="1">
+            <a:schemeClr val="accent1"/>
+          </a:fillRef>
+          <a:effectRef idx="0">
+            <a:schemeClr val="accent1"/>
+          </a:effectRef>
+          <a:fontRef idx="minor">
+            <a:schemeClr val="lt1"/>
+          </a:fontRef>
+        </p:style>
+        <p:txBody>
+          <a:bodyPr rtlCol="0" anchor="ctr"/>
+          <a:lstStyle/>
+          <a:p>
+            <a:pPr algn="ctr"/>
+            <a:endParaRPr lang="en-US"/>
+          </a:p>
+        </p:txBody>
+      </p:sp>
+      <p:sp>
+        <p:nvSpPr>
+          <p:cNvPr id="2" name="Title 1">
+            <a:extLst>
+              <a:ext uri="{FF2B5EF4-FFF2-40B4-BE49-F238E27FC236}">
+                <a16:creationId xmlns:a16="http://schemas.microsoft.com/office/drawing/2014/main" id="{07340E5D-F01F-4CF4-A596-F77969CFE293}"/>
+              </a:ext>
+            </a:extLst>
+          </p:cNvPr>
+          <p:cNvSpPr>
+            <a:spLocks noGrp="1"/>
+          </p:cNvSpPr>
+          <p:nvPr>
+            <p:ph type="title"/>
+          </p:nvPr>
+        </p:nvSpPr>
+        <p:spPr>
+          <a:xfrm>
+            <a:off x="8471424" y="1110882"/>
+            <a:ext cx="3053039" cy="1060817"/>
+          </a:xfrm>
+        </p:spPr>
+        <p:txBody>
+          <a:bodyPr anchor="b">
+            <a:normAutofit/>
+          </a:bodyPr>
+          <a:lstStyle/>
+          <a:p>
+            <a:r>
+              <a:rPr lang="en-IN" sz="2800" dirty="0"/>
+              <a:t>ELASTICSEARCH</a:t>
+            </a:r>
+          </a:p>
+        </p:txBody>
+      </p:sp>
+      <p:pic>
+        <p:nvPicPr>
+          <p:cNvPr id="5" name="Content Placeholder 4">
+            <a:extLst>
+              <a:ext uri="{FF2B5EF4-FFF2-40B4-BE49-F238E27FC236}">
+                <a16:creationId xmlns:a16="http://schemas.microsoft.com/office/drawing/2014/main" id="{F1B5A354-C6A5-403F-BD7F-A4164EF58B51}"/>
+              </a:ext>
+            </a:extLst>
+          </p:cNvPr>
+          <p:cNvPicPr>
+            <a:picLocks noChangeAspect="1"/>
+          </p:cNvPicPr>
+          <p:nvPr/>
+        </p:nvPicPr>
+        <p:blipFill>
+          <a:blip r:embed="rId2"/>
+          <a:stretch>
+            <a:fillRect/>
+          </a:stretch>
+        </p:blipFill>
+        <p:spPr>
+          <a:xfrm>
+            <a:off x="634275" y="1634901"/>
+            <a:ext cx="6900380" cy="3588197"/>
+          </a:xfrm>
+          <a:prstGeom prst="rect">
+            <a:avLst/>
+          </a:prstGeom>
+        </p:spPr>
+      </p:pic>
+      <p:sp>
+        <p:nvSpPr>
+          <p:cNvPr id="9" name="Content Placeholder 8">
+            <a:extLst>
+              <a:ext uri="{FF2B5EF4-FFF2-40B4-BE49-F238E27FC236}">
+                <a16:creationId xmlns:a16="http://schemas.microsoft.com/office/drawing/2014/main" id="{5A65F733-D937-4ECE-9808-8FAA68BFCBAE}"/>
+              </a:ext>
+            </a:extLst>
+          </p:cNvPr>
+          <p:cNvSpPr>
+            <a:spLocks noGrp="1"/>
+          </p:cNvSpPr>
+          <p:nvPr>
+            <p:ph idx="1"/>
+          </p:nvPr>
+        </p:nvSpPr>
+        <p:spPr>
+          <a:xfrm>
+            <a:off x="8471423" y="2286000"/>
+            <a:ext cx="3053039" cy="3931920"/>
+          </a:xfrm>
+        </p:spPr>
+        <p:txBody>
+          <a:bodyPr>
+            <a:normAutofit/>
+          </a:bodyPr>
+          <a:lstStyle/>
+          <a:p>
+            <a:endParaRPr lang="en-US" sz="1600" dirty="0"/>
+          </a:p>
+        </p:txBody>
+      </p:sp>
+      <p:sp>
+        <p:nvSpPr>
+          <p:cNvPr id="14" name="Freeform 6">
+            <a:extLst>
+              <a:ext uri="{FF2B5EF4-FFF2-40B4-BE49-F238E27FC236}">
+                <a16:creationId xmlns:a16="http://schemas.microsoft.com/office/drawing/2014/main" id="{CC1026F7-DECB-49B4-A565-518BBA445471}"/>
+              </a:ext>
+              <a:ext uri="{C183D7F6-B498-43B3-948B-1728B52AA6E4}">
+                <adec:decorative xmlns:adec="http://schemas.microsoft.com/office/drawing/2017/decorative" val="1"/>
+              </a:ext>
+            </a:extLst>
+          </p:cNvPr>
+          <p:cNvSpPr>
+            <a:spLocks noGrp="1" noRot="1" noChangeAspect="1" noMove="1" noResize="1" noEditPoints="1" noAdjustHandles="1" noChangeArrowheads="1" noChangeShapeType="1" noTextEdit="1"/>
+          </p:cNvSpPr>
+          <p:nvPr>
+            <p:extLst>
+              <p:ext uri="{386F3935-93C4-4BCD-93E2-E3B085C9AB24}">
+                <p16:designElem xmlns:p16="http://schemas.microsoft.com/office/powerpoint/2015/main" val="1"/>
+              </p:ext>
+            </p:extLst>
+          </p:nvPr>
+        </p:nvSpPr>
+        <p:spPr bwMode="auto">
+          <a:xfrm flipH="1" flipV="1">
+            <a:off x="7983434" y="640080"/>
+            <a:ext cx="2296028" cy="3674981"/>
+          </a:xfrm>
+          <a:custGeom>
+            <a:avLst/>
+            <a:gdLst/>
+            <a:ahLst/>
+            <a:cxnLst/>
+            <a:rect l="l" t="t" r="r" b="b"/>
+            <a:pathLst>
+              <a:path w="10002" h="10000">
+                <a:moveTo>
+                  <a:pt x="8763" y="0"/>
+                </a:moveTo>
+                <a:lnTo>
+                  <a:pt x="10002" y="0"/>
+                </a:lnTo>
+                <a:lnTo>
+                  <a:pt x="10002" y="10000"/>
+                </a:lnTo>
+                <a:lnTo>
+                  <a:pt x="2" y="10000"/>
+                </a:lnTo>
+                <a:cubicBezTo>
+                  <a:pt x="-2" y="9698"/>
+                  <a:pt x="4" y="9427"/>
+                  <a:pt x="0" y="9125"/>
+                </a:cubicBezTo>
+                <a:lnTo>
+                  <a:pt x="8763" y="9128"/>
+                </a:lnTo>
+                <a:lnTo>
+                  <a:pt x="8763" y="0"/>
+                </a:lnTo>
+                <a:close/>
+              </a:path>
+            </a:pathLst>
+          </a:custGeom>
+          <a:solidFill>
+            <a:schemeClr val="tx2"/>
+          </a:solidFill>
+          <a:ln w="0">
+            <a:noFill/>
+            <a:prstDash val="solid"/>
+            <a:round/>
+            <a:headEnd/>
+            <a:tailEnd/>
+          </a:ln>
+        </p:spPr>
+      </p:sp>
+    </p:spTree>
+    <p:extLst>
+      <p:ext uri="{BB962C8B-B14F-4D97-AF65-F5344CB8AC3E}">
+        <p14:creationId xmlns:p14="http://schemas.microsoft.com/office/powerpoint/2010/main" val="3218242216"/>
+      </p:ext>
+    </p:extLst>
+  </p:cSld>
+  <p:clrMapOvr>
+    <a:masterClrMapping/>
+  </p:clrMapOvr>
+</p:sld>
+</file>
+
+<file path=ppt/slides/slide11.xml><?xml version="1.0" encoding="utf-8"?>
+<p:sld xmlns:a="http://schemas.openxmlformats.org/drawingml/2006/main" xmlns:r="http://schemas.openxmlformats.org/officeDocument/2006/relationships" xmlns:p="http://schemas.openxmlformats.org/presentationml/2006/main">
+  <p:cSld>
+    <p:bg>
+      <p:bgPr>
+        <a:solidFill>
+          <a:schemeClr val="bg2"/>
+        </a:solidFill>
+        <a:effectLst/>
+      </p:bgPr>
+    </p:bg>
+    <p:spTree>
+      <p:nvGrpSpPr>
+        <p:cNvPr id="1" name=""/>
+        <p:cNvGrpSpPr/>
+        <p:nvPr/>
+      </p:nvGrpSpPr>
+      <p:grpSpPr>
+        <a:xfrm>
+          <a:off x="0" y="0"/>
+          <a:ext cx="0" cy="0"/>
+          <a:chOff x="0" y="0"/>
+          <a:chExt cx="0" cy="0"/>
+        </a:xfrm>
+      </p:grpSpPr>
+      <p:sp useBgFill="1">
+        <p:nvSpPr>
+          <p:cNvPr id="12" name="Rectangle 11">
+            <a:extLst>
+              <a:ext uri="{FF2B5EF4-FFF2-40B4-BE49-F238E27FC236}">
+                <a16:creationId xmlns:a16="http://schemas.microsoft.com/office/drawing/2014/main" id="{1D868099-6145-4BC0-A5EA-74BEF1776BA9}"/>
+              </a:ext>
+              <a:ext uri="{C183D7F6-B498-43B3-948B-1728B52AA6E4}">
+                <adec:decorative xmlns:adec="http://schemas.microsoft.com/office/drawing/2017/decorative" val="1"/>
+              </a:ext>
+            </a:extLst>
+          </p:cNvPr>
+          <p:cNvSpPr>
+            <a:spLocks noGrp="1" noRot="1" noChangeAspect="1" noMove="1" noResize="1" noEditPoints="1" noAdjustHandles="1" noChangeArrowheads="1" noChangeShapeType="1" noTextEdit="1"/>
+          </p:cNvSpPr>
+          <p:nvPr>
+            <p:extLst>
+              <p:ext uri="{386F3935-93C4-4BCD-93E2-E3B085C9AB24}">
+                <p16:designElem xmlns:p16="http://schemas.microsoft.com/office/powerpoint/2015/main" val="1"/>
+              </p:ext>
+            </p:extLst>
+          </p:nvPr>
+        </p:nvSpPr>
+        <p:spPr>
+          <a:xfrm>
+            <a:off x="0" y="0"/>
+            <a:ext cx="12192000" cy="6858000"/>
+          </a:xfrm>
+          <a:prstGeom prst="rect">
+            <a:avLst/>
+          </a:prstGeom>
+          <a:ln>
+            <a:noFill/>
+          </a:ln>
+        </p:spPr>
+        <p:style>
+          <a:lnRef idx="2">
+            <a:schemeClr val="accent1">
+              <a:shade val="50000"/>
+            </a:schemeClr>
+          </a:lnRef>
+          <a:fillRef idx="1">
+            <a:schemeClr val="accent1"/>
+          </a:fillRef>
+          <a:effectRef idx="0">
+            <a:schemeClr val="accent1"/>
+          </a:effectRef>
+          <a:fontRef idx="minor">
+            <a:schemeClr val="lt1"/>
+          </a:fontRef>
+        </p:style>
+        <p:txBody>
+          <a:bodyPr rtlCol="0" anchor="ctr"/>
+          <a:lstStyle/>
+          <a:p>
+            <a:pPr algn="ctr"/>
+            <a:endParaRPr lang="en-US"/>
+          </a:p>
+        </p:txBody>
+      </p:sp>
+      <p:sp>
+        <p:nvSpPr>
+          <p:cNvPr id="2" name="Title 1">
+            <a:extLst>
+              <a:ext uri="{FF2B5EF4-FFF2-40B4-BE49-F238E27FC236}">
+                <a16:creationId xmlns:a16="http://schemas.microsoft.com/office/drawing/2014/main" id="{37889B0F-526E-487B-920C-E1E6A2891365}"/>
+              </a:ext>
+            </a:extLst>
+          </p:cNvPr>
+          <p:cNvSpPr>
+            <a:spLocks noGrp="1"/>
+          </p:cNvSpPr>
+          <p:nvPr>
+            <p:ph type="title"/>
+          </p:nvPr>
+        </p:nvSpPr>
+        <p:spPr>
+          <a:xfrm>
+            <a:off x="8471424" y="1110882"/>
+            <a:ext cx="3053039" cy="1060817"/>
+          </a:xfrm>
+        </p:spPr>
+        <p:txBody>
+          <a:bodyPr anchor="b">
+            <a:normAutofit/>
+          </a:bodyPr>
+          <a:lstStyle/>
+          <a:p>
+            <a:r>
+              <a:rPr lang="en-IN" sz="2800"/>
+              <a:t>KIBANA</a:t>
+            </a:r>
+          </a:p>
+        </p:txBody>
+      </p:sp>
+      <p:pic>
+        <p:nvPicPr>
+          <p:cNvPr id="5" name="Content Placeholder 4">
+            <a:extLst>
+              <a:ext uri="{FF2B5EF4-FFF2-40B4-BE49-F238E27FC236}">
+                <a16:creationId xmlns:a16="http://schemas.microsoft.com/office/drawing/2014/main" id="{BE6B428C-FD61-4DDB-BEC5-791BE58A90C7}"/>
+              </a:ext>
+            </a:extLst>
+          </p:cNvPr>
+          <p:cNvPicPr>
+            <a:picLocks noChangeAspect="1"/>
+          </p:cNvPicPr>
+          <p:nvPr/>
+        </p:nvPicPr>
+        <p:blipFill>
+          <a:blip r:embed="rId2"/>
+          <a:stretch>
+            <a:fillRect/>
+          </a:stretch>
+        </p:blipFill>
+        <p:spPr>
+          <a:xfrm>
+            <a:off x="1036147" y="640080"/>
+            <a:ext cx="6096635" cy="5577840"/>
+          </a:xfrm>
+          <a:prstGeom prst="rect">
+            <a:avLst/>
+          </a:prstGeom>
+        </p:spPr>
+      </p:pic>
+      <p:sp>
+        <p:nvSpPr>
+          <p:cNvPr id="9" name="Content Placeholder 8">
+            <a:extLst>
+              <a:ext uri="{FF2B5EF4-FFF2-40B4-BE49-F238E27FC236}">
+                <a16:creationId xmlns:a16="http://schemas.microsoft.com/office/drawing/2014/main" id="{8DAE2DE5-A5DB-4052-AB07-9CD95ECAB0AE}"/>
+              </a:ext>
+            </a:extLst>
+          </p:cNvPr>
+          <p:cNvSpPr>
+            <a:spLocks noGrp="1"/>
+          </p:cNvSpPr>
+          <p:nvPr>
+            <p:ph idx="1"/>
+          </p:nvPr>
+        </p:nvSpPr>
+        <p:spPr>
+          <a:xfrm>
+            <a:off x="8471423" y="2286000"/>
+            <a:ext cx="3053039" cy="3931920"/>
+          </a:xfrm>
+        </p:spPr>
+        <p:txBody>
+          <a:bodyPr>
+            <a:normAutofit/>
+          </a:bodyPr>
+          <a:lstStyle/>
+          <a:p>
+            <a:endParaRPr lang="en-US" sz="1600" dirty="0"/>
+          </a:p>
+        </p:txBody>
+      </p:sp>
+      <p:sp>
+        <p:nvSpPr>
+          <p:cNvPr id="14" name="Freeform 6">
+            <a:extLst>
+              <a:ext uri="{FF2B5EF4-FFF2-40B4-BE49-F238E27FC236}">
+                <a16:creationId xmlns:a16="http://schemas.microsoft.com/office/drawing/2014/main" id="{CC1026F7-DECB-49B4-A565-518BBA445471}"/>
+              </a:ext>
+              <a:ext uri="{C183D7F6-B498-43B3-948B-1728B52AA6E4}">
+                <adec:decorative xmlns:adec="http://schemas.microsoft.com/office/drawing/2017/decorative" val="1"/>
+              </a:ext>
+            </a:extLst>
+          </p:cNvPr>
+          <p:cNvSpPr>
+            <a:spLocks noGrp="1" noRot="1" noChangeAspect="1" noMove="1" noResize="1" noEditPoints="1" noAdjustHandles="1" noChangeArrowheads="1" noChangeShapeType="1" noTextEdit="1"/>
+          </p:cNvSpPr>
+          <p:nvPr>
+            <p:extLst>
+              <p:ext uri="{386F3935-93C4-4BCD-93E2-E3B085C9AB24}">
+                <p16:designElem xmlns:p16="http://schemas.microsoft.com/office/powerpoint/2015/main" val="1"/>
+              </p:ext>
+            </p:extLst>
+          </p:nvPr>
+        </p:nvSpPr>
+        <p:spPr bwMode="auto">
+          <a:xfrm flipH="1" flipV="1">
+            <a:off x="7983434" y="640080"/>
+            <a:ext cx="2296028" cy="3674981"/>
+          </a:xfrm>
+          <a:custGeom>
+            <a:avLst/>
+            <a:gdLst/>
+            <a:ahLst/>
+            <a:cxnLst/>
+            <a:rect l="l" t="t" r="r" b="b"/>
+            <a:pathLst>
+              <a:path w="10002" h="10000">
+                <a:moveTo>
+                  <a:pt x="8763" y="0"/>
+                </a:moveTo>
+                <a:lnTo>
+                  <a:pt x="10002" y="0"/>
+                </a:lnTo>
+                <a:lnTo>
+                  <a:pt x="10002" y="10000"/>
+                </a:lnTo>
+                <a:lnTo>
+                  <a:pt x="2" y="10000"/>
+                </a:lnTo>
+                <a:cubicBezTo>
+                  <a:pt x="-2" y="9698"/>
+                  <a:pt x="4" y="9427"/>
+                  <a:pt x="0" y="9125"/>
+                </a:cubicBezTo>
+                <a:lnTo>
+                  <a:pt x="8763" y="9128"/>
+                </a:lnTo>
+                <a:lnTo>
+                  <a:pt x="8763" y="0"/>
+                </a:lnTo>
+                <a:close/>
+              </a:path>
+            </a:pathLst>
+          </a:custGeom>
+          <a:solidFill>
+            <a:schemeClr val="tx2"/>
+          </a:solidFill>
+          <a:ln w="0">
+            <a:noFill/>
+            <a:prstDash val="solid"/>
+            <a:round/>
+            <a:headEnd/>
+            <a:tailEnd/>
+          </a:ln>
+        </p:spPr>
+      </p:sp>
+    </p:spTree>
+    <p:extLst>
+      <p:ext uri="{BB962C8B-B14F-4D97-AF65-F5344CB8AC3E}">
+        <p14:creationId xmlns:p14="http://schemas.microsoft.com/office/powerpoint/2010/main" val="183464105"/>
+      </p:ext>
+    </p:extLst>
+  </p:cSld>
+  <p:clrMapOvr>
+    <a:masterClrMapping/>
+  </p:clrMapOvr>
+</p:sld>
+</file>
+
+<file path=ppt/slides/slide12.xml><?xml version="1.0" encoding="utf-8"?>
+<p:sld xmlns:a="http://schemas.openxmlformats.org/drawingml/2006/main" xmlns:r="http://schemas.openxmlformats.org/officeDocument/2006/relationships" xmlns:p="http://schemas.openxmlformats.org/presentationml/2006/main">
+  <p:cSld>
+    <p:spTree>
+      <p:nvGrpSpPr>
+        <p:cNvPr id="1" name=""/>
+        <p:cNvGrpSpPr/>
+        <p:nvPr/>
+      </p:nvGrpSpPr>
+      <p:grpSpPr>
+        <a:xfrm>
+          <a:off x="0" y="0"/>
+          <a:ext cx="0" cy="0"/>
+          <a:chOff x="0" y="0"/>
+          <a:chExt cx="0" cy="0"/>
+        </a:xfrm>
+      </p:grpSpPr>
+      <p:sp>
+        <p:nvSpPr>
+          <p:cNvPr id="2" name="Title 1">
+            <a:extLst>
+              <a:ext uri="{FF2B5EF4-FFF2-40B4-BE49-F238E27FC236}">
+                <a16:creationId xmlns:a16="http://schemas.microsoft.com/office/drawing/2014/main" id="{515CF57B-A503-4A11-B7EE-9111295434BF}"/>
+              </a:ext>
+            </a:extLst>
+          </p:cNvPr>
+          <p:cNvSpPr>
+            <a:spLocks noGrp="1"/>
+          </p:cNvSpPr>
+          <p:nvPr>
+            <p:ph type="title"/>
+          </p:nvPr>
+        </p:nvSpPr>
+        <p:spPr/>
+        <p:txBody>
+          <a:bodyPr/>
+          <a:lstStyle/>
+          <a:p>
+            <a:pPr algn="ctr"/>
+            <a:r>
+              <a:rPr lang="en-IN" dirty="0"/>
+              <a:t>DASHBOARDS</a:t>
+            </a:r>
+          </a:p>
+        </p:txBody>
+      </p:sp>
+      <p:sp>
+        <p:nvSpPr>
+          <p:cNvPr id="3" name="Content Placeholder 2">
+            <a:extLst>
+              <a:ext uri="{FF2B5EF4-FFF2-40B4-BE49-F238E27FC236}">
+                <a16:creationId xmlns:a16="http://schemas.microsoft.com/office/drawing/2014/main" id="{4EB840B6-9A37-4872-9838-88C3B1E7623F}"/>
+              </a:ext>
+            </a:extLst>
+          </p:cNvPr>
+          <p:cNvSpPr>
+            <a:spLocks noGrp="1"/>
+          </p:cNvSpPr>
+          <p:nvPr>
+            <p:ph idx="1"/>
+          </p:nvPr>
+        </p:nvSpPr>
+        <p:spPr/>
+        <p:txBody>
+          <a:bodyPr/>
+          <a:lstStyle/>
+          <a:p>
+            <a:endParaRPr lang="en-IN"/>
+          </a:p>
+        </p:txBody>
+      </p:sp>
+    </p:spTree>
+    <p:extLst>
+      <p:ext uri="{BB962C8B-B14F-4D97-AF65-F5344CB8AC3E}">
+        <p14:creationId xmlns:p14="http://schemas.microsoft.com/office/powerpoint/2010/main" val="1732242542"/>
+      </p:ext>
+    </p:extLst>
+  </p:cSld>
+  <p:clrMapOvr>
+    <a:masterClrMapping/>
+  </p:clrMapOvr>
+</p:sld>
+</file>
+
+<file path=ppt/slides/slide13.xml><?xml version="1.0" encoding="utf-8"?>
+<p:sld xmlns:a="http://schemas.openxmlformats.org/drawingml/2006/main" xmlns:r="http://schemas.openxmlformats.org/officeDocument/2006/relationships" xmlns:p="http://schemas.openxmlformats.org/presentationml/2006/main">
+  <p:cSld>
+    <p:spTree>
+      <p:nvGrpSpPr>
+        <p:cNvPr id="1" name=""/>
+        <p:cNvGrpSpPr/>
+        <p:nvPr/>
+      </p:nvGrpSpPr>
+      <p:grpSpPr>
+        <a:xfrm>
+          <a:off x="0" y="0"/>
+          <a:ext cx="0" cy="0"/>
+          <a:chOff x="0" y="0"/>
+          <a:chExt cx="0" cy="0"/>
+        </a:xfrm>
+      </p:grpSpPr>
+      <p:sp>
+        <p:nvSpPr>
+          <p:cNvPr id="2" name="Title 1">
+            <a:extLst>
+              <a:ext uri="{FF2B5EF4-FFF2-40B4-BE49-F238E27FC236}">
+                <a16:creationId xmlns:a16="http://schemas.microsoft.com/office/drawing/2014/main" id="{38166DE5-A3DA-48CD-9D18-968511FF513B}"/>
+              </a:ext>
+            </a:extLst>
+          </p:cNvPr>
+          <p:cNvSpPr>
+            <a:spLocks noGrp="1"/>
+          </p:cNvSpPr>
+          <p:nvPr>
+            <p:ph type="title"/>
+          </p:nvPr>
+        </p:nvSpPr>
+        <p:spPr/>
+        <p:txBody>
+          <a:bodyPr/>
+          <a:lstStyle/>
+          <a:p>
+            <a:r>
+              <a:rPr lang="en-IN" dirty="0" err="1"/>
+              <a:t>Cont</a:t>
+            </a:r>
+            <a:r>
+              <a:rPr lang="en-IN" dirty="0"/>
+              <a:t>…</a:t>
+            </a:r>
+          </a:p>
+        </p:txBody>
+      </p:sp>
+      <p:sp>
+        <p:nvSpPr>
+          <p:cNvPr id="3" name="Content Placeholder 2">
+            <a:extLst>
+              <a:ext uri="{FF2B5EF4-FFF2-40B4-BE49-F238E27FC236}">
+                <a16:creationId xmlns:a16="http://schemas.microsoft.com/office/drawing/2014/main" id="{AA92B398-3AAE-458E-82CD-0D50D92F073B}"/>
+              </a:ext>
+            </a:extLst>
+          </p:cNvPr>
+          <p:cNvSpPr>
+            <a:spLocks noGrp="1"/>
+          </p:cNvSpPr>
+          <p:nvPr>
+            <p:ph idx="1"/>
+          </p:nvPr>
+        </p:nvSpPr>
+        <p:spPr/>
+        <p:txBody>
+          <a:bodyPr/>
+          <a:lstStyle/>
+          <a:p>
+            <a:endParaRPr lang="en-IN"/>
+          </a:p>
+        </p:txBody>
+      </p:sp>
+    </p:spTree>
+    <p:extLst>
+      <p:ext uri="{BB962C8B-B14F-4D97-AF65-F5344CB8AC3E}">
+        <p14:creationId xmlns:p14="http://schemas.microsoft.com/office/powerpoint/2010/main" val="2021500579"/>
+      </p:ext>
+    </p:extLst>
+  </p:cSld>
+  <p:clrMapOvr>
+    <a:masterClrMapping/>
+  </p:clrMapOvr>
+</p:sld>
+</file>
+
+<file path=ppt/slides/slide14.xml><?xml version="1.0" encoding="utf-8"?>
+<p:sld xmlns:a="http://schemas.openxmlformats.org/drawingml/2006/main" xmlns:r="http://schemas.openxmlformats.org/officeDocument/2006/relationships" xmlns:p="http://schemas.openxmlformats.org/presentationml/2006/main">
+  <p:cSld>
+    <p:bg>
+      <p:bgPr>
+        <a:solidFill>
+          <a:schemeClr val="bg2"/>
+        </a:solidFill>
+        <a:effectLst/>
+      </p:bgPr>
+    </p:bg>
+    <p:spTree>
+      <p:nvGrpSpPr>
+        <p:cNvPr id="1" name=""/>
+        <p:cNvGrpSpPr/>
+        <p:nvPr/>
+      </p:nvGrpSpPr>
+      <p:grpSpPr>
+        <a:xfrm>
+          <a:off x="0" y="0"/>
+          <a:ext cx="0" cy="0"/>
+          <a:chOff x="0" y="0"/>
+          <a:chExt cx="0" cy="0"/>
+        </a:xfrm>
+      </p:grpSpPr>
+      <p:sp useBgFill="1">
+        <p:nvSpPr>
+          <p:cNvPr id="12" name="Rectangle 11">
+            <a:extLst>
+              <a:ext uri="{FF2B5EF4-FFF2-40B4-BE49-F238E27FC236}">
+                <a16:creationId xmlns:a16="http://schemas.microsoft.com/office/drawing/2014/main" id="{1D868099-6145-4BC0-A5EA-74BEF1776BA9}"/>
+              </a:ext>
+              <a:ext uri="{C183D7F6-B498-43B3-948B-1728B52AA6E4}">
+                <adec:decorative xmlns:adec="http://schemas.microsoft.com/office/drawing/2017/decorative" val="1"/>
+              </a:ext>
+            </a:extLst>
+          </p:cNvPr>
+          <p:cNvSpPr>
+            <a:spLocks noGrp="1" noRot="1" noChangeAspect="1" noMove="1" noResize="1" noEditPoints="1" noAdjustHandles="1" noChangeArrowheads="1" noChangeShapeType="1" noTextEdit="1"/>
+          </p:cNvSpPr>
+          <p:nvPr>
+            <p:extLst>
+              <p:ext uri="{386F3935-93C4-4BCD-93E2-E3B085C9AB24}">
+                <p16:designElem xmlns:p16="http://schemas.microsoft.com/office/powerpoint/2015/main" val="1"/>
+              </p:ext>
+            </p:extLst>
+          </p:nvPr>
+        </p:nvSpPr>
+        <p:spPr>
+          <a:xfrm>
+            <a:off x="0" y="0"/>
+            <a:ext cx="12192000" cy="6858000"/>
+          </a:xfrm>
+          <a:prstGeom prst="rect">
+            <a:avLst/>
+          </a:prstGeom>
+          <a:ln>
+            <a:noFill/>
+          </a:ln>
+        </p:spPr>
+        <p:style>
+          <a:lnRef idx="2">
+            <a:schemeClr val="accent1">
+              <a:shade val="50000"/>
+            </a:schemeClr>
+          </a:lnRef>
+          <a:fillRef idx="1">
+            <a:schemeClr val="accent1"/>
+          </a:fillRef>
+          <a:effectRef idx="0">
+            <a:schemeClr val="accent1"/>
+          </a:effectRef>
+          <a:fontRef idx="minor">
+            <a:schemeClr val="lt1"/>
+          </a:fontRef>
+        </p:style>
+        <p:txBody>
+          <a:bodyPr rtlCol="0" anchor="ctr"/>
+          <a:lstStyle/>
+          <a:p>
+            <a:pPr algn="ctr"/>
+            <a:endParaRPr lang="en-US"/>
+          </a:p>
+        </p:txBody>
+      </p:sp>
+      <p:sp>
+        <p:nvSpPr>
+          <p:cNvPr id="2" name="Title 1">
+            <a:extLst>
+              <a:ext uri="{FF2B5EF4-FFF2-40B4-BE49-F238E27FC236}">
+                <a16:creationId xmlns:a16="http://schemas.microsoft.com/office/drawing/2014/main" id="{8085EB40-1FBE-4AF4-B067-AB786CC5AAF6}"/>
+              </a:ext>
+            </a:extLst>
+          </p:cNvPr>
+          <p:cNvSpPr>
+            <a:spLocks noGrp="1"/>
+          </p:cNvSpPr>
+          <p:nvPr>
+            <p:ph type="title"/>
+          </p:nvPr>
+        </p:nvSpPr>
+        <p:spPr>
+          <a:xfrm>
+            <a:off x="8471424" y="1110882"/>
+            <a:ext cx="3053039" cy="1060817"/>
+          </a:xfrm>
+        </p:spPr>
+        <p:txBody>
+          <a:bodyPr anchor="b">
+            <a:normAutofit/>
+          </a:bodyPr>
+          <a:lstStyle/>
+          <a:p>
+            <a:r>
+              <a:rPr lang="en-IN" sz="2800"/>
+              <a:t>NGINX</a:t>
+            </a:r>
+          </a:p>
+        </p:txBody>
+      </p:sp>
+      <p:pic>
+        <p:nvPicPr>
+          <p:cNvPr id="5" name="Content Placeholder 4">
+            <a:extLst>
+              <a:ext uri="{FF2B5EF4-FFF2-40B4-BE49-F238E27FC236}">
+                <a16:creationId xmlns:a16="http://schemas.microsoft.com/office/drawing/2014/main" id="{3E6092C9-E625-4F71-84E9-A1E854397AC3}"/>
+              </a:ext>
+            </a:extLst>
+          </p:cNvPr>
+          <p:cNvPicPr>
+            <a:picLocks noChangeAspect="1"/>
+          </p:cNvPicPr>
+          <p:nvPr/>
+        </p:nvPicPr>
+        <p:blipFill>
+          <a:blip r:embed="rId2"/>
+          <a:stretch>
+            <a:fillRect/>
+          </a:stretch>
+        </p:blipFill>
+        <p:spPr>
+          <a:xfrm>
+            <a:off x="634275" y="1827126"/>
+            <a:ext cx="6900380" cy="3203747"/>
+          </a:xfrm>
+          <a:prstGeom prst="rect">
+            <a:avLst/>
+          </a:prstGeom>
+        </p:spPr>
+      </p:pic>
+      <p:sp>
+        <p:nvSpPr>
+          <p:cNvPr id="9" name="Content Placeholder 8">
+            <a:extLst>
+              <a:ext uri="{FF2B5EF4-FFF2-40B4-BE49-F238E27FC236}">
+                <a16:creationId xmlns:a16="http://schemas.microsoft.com/office/drawing/2014/main" id="{C95F4683-CCC5-4075-9B2C-6E0889256647}"/>
+              </a:ext>
+            </a:extLst>
+          </p:cNvPr>
+          <p:cNvSpPr>
+            <a:spLocks noGrp="1"/>
+          </p:cNvSpPr>
+          <p:nvPr>
+            <p:ph idx="1"/>
+          </p:nvPr>
+        </p:nvSpPr>
+        <p:spPr>
+          <a:xfrm>
+            <a:off x="8471423" y="2286000"/>
+            <a:ext cx="3053039" cy="3931920"/>
+          </a:xfrm>
+        </p:spPr>
+        <p:txBody>
+          <a:bodyPr>
+            <a:normAutofit/>
+          </a:bodyPr>
+          <a:lstStyle/>
+          <a:p>
+            <a:endParaRPr lang="en-US" sz="1600"/>
+          </a:p>
+        </p:txBody>
+      </p:sp>
+      <p:sp>
+        <p:nvSpPr>
+          <p:cNvPr id="14" name="Freeform 6">
+            <a:extLst>
+              <a:ext uri="{FF2B5EF4-FFF2-40B4-BE49-F238E27FC236}">
+                <a16:creationId xmlns:a16="http://schemas.microsoft.com/office/drawing/2014/main" id="{CC1026F7-DECB-49B4-A565-518BBA445471}"/>
+              </a:ext>
+              <a:ext uri="{C183D7F6-B498-43B3-948B-1728B52AA6E4}">
+                <adec:decorative xmlns:adec="http://schemas.microsoft.com/office/drawing/2017/decorative" val="1"/>
+              </a:ext>
+            </a:extLst>
+          </p:cNvPr>
+          <p:cNvSpPr>
+            <a:spLocks noGrp="1" noRot="1" noChangeAspect="1" noMove="1" noResize="1" noEditPoints="1" noAdjustHandles="1" noChangeArrowheads="1" noChangeShapeType="1" noTextEdit="1"/>
+          </p:cNvSpPr>
+          <p:nvPr>
+            <p:extLst>
+              <p:ext uri="{386F3935-93C4-4BCD-93E2-E3B085C9AB24}">
+                <p16:designElem xmlns:p16="http://schemas.microsoft.com/office/powerpoint/2015/main" val="1"/>
+              </p:ext>
+            </p:extLst>
+          </p:nvPr>
+        </p:nvSpPr>
+        <p:spPr bwMode="auto">
+          <a:xfrm flipH="1" flipV="1">
+            <a:off x="7983434" y="640080"/>
+            <a:ext cx="2296028" cy="3674981"/>
+          </a:xfrm>
+          <a:custGeom>
+            <a:avLst/>
+            <a:gdLst/>
+            <a:ahLst/>
+            <a:cxnLst/>
+            <a:rect l="l" t="t" r="r" b="b"/>
+            <a:pathLst>
+              <a:path w="10002" h="10000">
+                <a:moveTo>
+                  <a:pt x="8763" y="0"/>
+                </a:moveTo>
+                <a:lnTo>
+                  <a:pt x="10002" y="0"/>
+                </a:lnTo>
+                <a:lnTo>
+                  <a:pt x="10002" y="10000"/>
+                </a:lnTo>
+                <a:lnTo>
+                  <a:pt x="2" y="10000"/>
+                </a:lnTo>
+                <a:cubicBezTo>
+                  <a:pt x="-2" y="9698"/>
+                  <a:pt x="4" y="9427"/>
+                  <a:pt x="0" y="9125"/>
+                </a:cubicBezTo>
+                <a:lnTo>
+                  <a:pt x="8763" y="9128"/>
+                </a:lnTo>
+                <a:lnTo>
+                  <a:pt x="8763" y="0"/>
+                </a:lnTo>
+                <a:close/>
+              </a:path>
+            </a:pathLst>
+          </a:custGeom>
+          <a:solidFill>
+            <a:schemeClr val="tx2"/>
+          </a:solidFill>
+          <a:ln w="0">
+            <a:noFill/>
+            <a:prstDash val="solid"/>
+            <a:round/>
+            <a:headEnd/>
+            <a:tailEnd/>
+          </a:ln>
+        </p:spPr>
+      </p:sp>
+    </p:spTree>
+    <p:extLst>
+      <p:ext uri="{BB962C8B-B14F-4D97-AF65-F5344CB8AC3E}">
+        <p14:creationId xmlns:p14="http://schemas.microsoft.com/office/powerpoint/2010/main" val="2574331402"/>
+      </p:ext>
+    </p:extLst>
+  </p:cSld>
+  <p:clrMapOvr>
+    <a:masterClrMapping/>
+  </p:clrMapOvr>
+</p:sld>
+</file>
+
+<file path=ppt/slides/slide15.xml><?xml version="1.0" encoding="utf-8"?>
+<p:sld xmlns:a="http://schemas.openxmlformats.org/drawingml/2006/main" xmlns:r="http://schemas.openxmlformats.org/officeDocument/2006/relationships" xmlns:p="http://schemas.openxmlformats.org/presentationml/2006/main">
+  <p:cSld>
+    <p:bg>
+      <p:bgPr>
+        <a:solidFill>
+          <a:schemeClr val="bg2"/>
+        </a:solidFill>
+        <a:effectLst/>
+      </p:bgPr>
+    </p:bg>
+    <p:spTree>
+      <p:nvGrpSpPr>
+        <p:cNvPr id="1" name=""/>
+        <p:cNvGrpSpPr/>
+        <p:nvPr/>
+      </p:nvGrpSpPr>
+      <p:grpSpPr>
+        <a:xfrm>
+          <a:off x="0" y="0"/>
+          <a:ext cx="0" cy="0"/>
+          <a:chOff x="0" y="0"/>
+          <a:chExt cx="0" cy="0"/>
+        </a:xfrm>
+      </p:grpSpPr>
+      <p:grpSp>
+        <p:nvGrpSpPr>
+          <p:cNvPr id="12" name="Group 11">
+            <a:extLst>
+              <a:ext uri="{FF2B5EF4-FFF2-40B4-BE49-F238E27FC236}">
+                <a16:creationId xmlns:a16="http://schemas.microsoft.com/office/drawing/2014/main" id="{449BC34D-9C23-4D6D-8213-1F471AF85B3F}"/>
+              </a:ext>
+              <a:ext uri="{C183D7F6-B498-43B3-948B-1728B52AA6E4}">
+                <adec:decorative xmlns:adec="http://schemas.microsoft.com/office/drawing/2017/decorative" val="1"/>
+              </a:ext>
+            </a:extLst>
+          </p:cNvPr>
+          <p:cNvGrpSpPr>
+            <a:grpSpLocks noGrp="1" noUngrp="1" noRot="1" noChangeAspect="1" noMove="1" noResize="1"/>
+          </p:cNvGrpSpPr>
+          <p:nvPr>
+            <p:extLst>
+              <p:ext uri="{386F3935-93C4-4BCD-93E2-E3B085C9AB24}">
+                <p16:designElem xmlns:p16="http://schemas.microsoft.com/office/powerpoint/2015/main" val="1"/>
+              </p:ext>
+            </p:extLst>
+          </p:nvPr>
+        </p:nvGrpSpPr>
+        <p:grpSpPr>
+          <a:xfrm>
+            <a:off x="752858" y="744469"/>
+            <a:ext cx="10674117" cy="5349671"/>
+            <a:chOff x="752858" y="744469"/>
+            <a:chExt cx="10674117" cy="5349671"/>
+          </a:xfrm>
+        </p:grpSpPr>
+        <p:sp>
+          <p:nvSpPr>
+            <p:cNvPr id="13" name="Freeform 6">
+              <a:extLst>
+                <a:ext uri="{FF2B5EF4-FFF2-40B4-BE49-F238E27FC236}">
+                  <a16:creationId xmlns:a16="http://schemas.microsoft.com/office/drawing/2014/main" id="{FA0F5D6C-5025-4D7E-82DD-C2C6FDA1E759}"/>
+                </a:ext>
+                <a:ext uri="{C183D7F6-B498-43B3-948B-1728B52AA6E4}">
+                  <adec:decorative xmlns:adec="http://schemas.microsoft.com/office/drawing/2017/decorative" val="1"/>
+                </a:ext>
+              </a:extLst>
+            </p:cNvPr>
+            <p:cNvSpPr/>
+            <p:nvPr>
+              <p:extLst>
+                <p:ext uri="{386F3935-93C4-4BCD-93E2-E3B085C9AB24}">
+                  <p16:designElem xmlns:p16="http://schemas.microsoft.com/office/powerpoint/2015/main" val="1"/>
+                </p:ext>
+              </p:extLst>
+            </p:nvPr>
+          </p:nvSpPr>
+          <p:spPr bwMode="auto">
+            <a:xfrm>
+              <a:off x="8151962" y="1685652"/>
+              <a:ext cx="3275013" cy="4408488"/>
+            </a:xfrm>
+            <a:custGeom>
+              <a:avLst/>
+              <a:gdLst/>
+              <a:ahLst/>
+              <a:cxnLst/>
+              <a:rect l="l" t="t" r="r" b="b"/>
+              <a:pathLst>
+                <a:path w="10000" h="10000">
+                  <a:moveTo>
+                    <a:pt x="8761" y="0"/>
+                  </a:moveTo>
+                  <a:lnTo>
+                    <a:pt x="10000" y="0"/>
+                  </a:lnTo>
+                  <a:lnTo>
+                    <a:pt x="10000" y="10000"/>
+                  </a:lnTo>
+                  <a:lnTo>
+                    <a:pt x="0" y="10000"/>
+                  </a:lnTo>
+                  <a:lnTo>
+                    <a:pt x="0" y="9126"/>
+                  </a:lnTo>
+                  <a:lnTo>
+                    <a:pt x="8761" y="9127"/>
+                  </a:lnTo>
+                  <a:lnTo>
+                    <a:pt x="8761" y="0"/>
+                  </a:lnTo>
+                  <a:close/>
+                </a:path>
+              </a:pathLst>
+            </a:custGeom>
+            <a:solidFill>
+              <a:schemeClr val="tx2"/>
+            </a:solidFill>
+            <a:ln w="0">
+              <a:noFill/>
+              <a:prstDash val="solid"/>
+              <a:round/>
+              <a:headEnd/>
+              <a:tailEnd/>
+            </a:ln>
+          </p:spPr>
+        </p:sp>
+        <p:sp>
+          <p:nvSpPr>
+            <p:cNvPr id="14" name="Freeform 6">
+              <a:extLst>
+                <a:ext uri="{FF2B5EF4-FFF2-40B4-BE49-F238E27FC236}">
+                  <a16:creationId xmlns:a16="http://schemas.microsoft.com/office/drawing/2014/main" id="{E2AF2C17-4AB4-4402-B84B-129EF95D161C}"/>
+                </a:ext>
+                <a:ext uri="{C183D7F6-B498-43B3-948B-1728B52AA6E4}">
+                  <adec:decorative xmlns:adec="http://schemas.microsoft.com/office/drawing/2017/decorative" val="1"/>
+                </a:ext>
+              </a:extLst>
+            </p:cNvPr>
+            <p:cNvSpPr/>
+            <p:nvPr>
+              <p:extLst>
+                <p:ext uri="{386F3935-93C4-4BCD-93E2-E3B085C9AB24}">
+                  <p16:designElem xmlns:p16="http://schemas.microsoft.com/office/powerpoint/2015/main" val="1"/>
+                </p:ext>
+              </p:extLst>
+            </p:nvPr>
+          </p:nvSpPr>
+          <p:spPr bwMode="auto">
+            <a:xfrm flipH="1" flipV="1">
+              <a:off x="752858" y="744469"/>
+              <a:ext cx="3275668" cy="4408488"/>
+            </a:xfrm>
+            <a:custGeom>
+              <a:avLst/>
+              <a:gdLst/>
+              <a:ahLst/>
+              <a:cxnLst/>
+              <a:rect l="l" t="t" r="r" b="b"/>
+              <a:pathLst>
+                <a:path w="10002" h="10000">
+                  <a:moveTo>
+                    <a:pt x="8763" y="0"/>
+                  </a:moveTo>
+                  <a:lnTo>
+                    <a:pt x="10002" y="0"/>
+                  </a:lnTo>
+                  <a:lnTo>
+                    <a:pt x="10002" y="10000"/>
+                  </a:lnTo>
+                  <a:lnTo>
+                    <a:pt x="2" y="10000"/>
+                  </a:lnTo>
+                  <a:cubicBezTo>
+                    <a:pt x="-2" y="9698"/>
+                    <a:pt x="4" y="9427"/>
+                    <a:pt x="0" y="9125"/>
+                  </a:cubicBezTo>
+                  <a:lnTo>
+                    <a:pt x="8763" y="9128"/>
+                  </a:lnTo>
+                  <a:lnTo>
+                    <a:pt x="8763" y="0"/>
+                  </a:lnTo>
+                  <a:close/>
+                </a:path>
+              </a:pathLst>
+            </a:custGeom>
+            <a:solidFill>
+              <a:schemeClr val="tx2"/>
+            </a:solidFill>
+            <a:ln w="0">
+              <a:noFill/>
+              <a:prstDash val="solid"/>
+              <a:round/>
+              <a:headEnd/>
+              <a:tailEnd/>
+            </a:ln>
+          </p:spPr>
+        </p:sp>
+      </p:grpSp>
+      <p:sp useBgFill="1">
+        <p:nvSpPr>
+          <p:cNvPr id="16" name="Rectangle 15">
+            <a:extLst>
+              <a:ext uri="{FF2B5EF4-FFF2-40B4-BE49-F238E27FC236}">
+                <a16:creationId xmlns:a16="http://schemas.microsoft.com/office/drawing/2014/main" id="{1F9A0C1C-8ABC-401B-8FE9-AC9327C4C587}"/>
+              </a:ext>
+              <a:ext uri="{C183D7F6-B498-43B3-948B-1728B52AA6E4}">
+                <adec:decorative xmlns:adec="http://schemas.microsoft.com/office/drawing/2017/decorative" val="1"/>
+              </a:ext>
+            </a:extLst>
+          </p:cNvPr>
+          <p:cNvSpPr>
+            <a:spLocks noGrp="1" noRot="1" noChangeAspect="1" noMove="1" noResize="1" noEditPoints="1" noAdjustHandles="1" noChangeArrowheads="1" noChangeShapeType="1" noTextEdit="1"/>
+          </p:cNvSpPr>
+          <p:nvPr>
+            <p:extLst>
+              <p:ext uri="{386F3935-93C4-4BCD-93E2-E3B085C9AB24}">
+                <p16:designElem xmlns:p16="http://schemas.microsoft.com/office/powerpoint/2015/main" val="1"/>
+              </p:ext>
+            </p:extLst>
+          </p:nvPr>
+        </p:nvSpPr>
+        <p:spPr>
+          <a:xfrm>
+            <a:off x="0" y="0"/>
+            <a:ext cx="12192000" cy="6858000"/>
+          </a:xfrm>
+          <a:prstGeom prst="rect">
+            <a:avLst/>
+          </a:prstGeom>
+          <a:ln>
+            <a:noFill/>
+          </a:ln>
+        </p:spPr>
+        <p:style>
+          <a:lnRef idx="2">
+            <a:schemeClr val="accent1">
+              <a:shade val="50000"/>
+            </a:schemeClr>
+          </a:lnRef>
+          <a:fillRef idx="1001">
+            <a:schemeClr val="lt2"/>
+          </a:fillRef>
+          <a:effectRef idx="0">
+            <a:schemeClr val="accent1"/>
+          </a:effectRef>
+          <a:fontRef idx="minor">
+            <a:schemeClr val="lt1"/>
+          </a:fontRef>
+        </p:style>
+        <p:txBody>
+          <a:bodyPr rtlCol="0" anchor="ctr"/>
+          <a:lstStyle/>
+          <a:p>
+            <a:pPr algn="ctr"/>
+            <a:endParaRPr lang="en-US"/>
+          </a:p>
+        </p:txBody>
+      </p:sp>
+      <p:sp>
+        <p:nvSpPr>
+          <p:cNvPr id="2" name="Title 1">
+            <a:extLst>
+              <a:ext uri="{FF2B5EF4-FFF2-40B4-BE49-F238E27FC236}">
+                <a16:creationId xmlns:a16="http://schemas.microsoft.com/office/drawing/2014/main" id="{F3735DDB-B53E-4E50-A5FB-C548B8ED3623}"/>
+              </a:ext>
+            </a:extLst>
+          </p:cNvPr>
+          <p:cNvSpPr>
+            <a:spLocks noGrp="1"/>
+          </p:cNvSpPr>
+          <p:nvPr>
+            <p:ph type="title"/>
+          </p:nvPr>
+        </p:nvSpPr>
+        <p:spPr>
+          <a:xfrm>
+            <a:off x="8154186" y="634028"/>
+            <a:ext cx="3355942" cy="3732835"/>
+          </a:xfrm>
+        </p:spPr>
+        <p:txBody>
+          <a:bodyPr vert="horz" lIns="91440" tIns="45720" rIns="91440" bIns="45720" rtlCol="0" anchor="b">
+            <a:normAutofit/>
+          </a:bodyPr>
+          <a:lstStyle/>
+          <a:p>
+            <a:pPr algn="ctr"/>
+            <a:br>
+              <a:rPr lang="en-US" sz="2400" cap="all" dirty="0"/>
+            </a:br>
+            <a:endParaRPr lang="en-US" sz="2400" cap="all" dirty="0"/>
+          </a:p>
+        </p:txBody>
+      </p:sp>
+      <p:sp>
+        <p:nvSpPr>
+          <p:cNvPr id="3" name="Content Placeholder 2">
+            <a:extLst>
+              <a:ext uri="{FF2B5EF4-FFF2-40B4-BE49-F238E27FC236}">
+                <a16:creationId xmlns:a16="http://schemas.microsoft.com/office/drawing/2014/main" id="{C96BB18A-A9BF-4AE7-BAC2-776053190F93}"/>
+              </a:ext>
+            </a:extLst>
+          </p:cNvPr>
+          <p:cNvSpPr>
+            <a:spLocks noGrp="1"/>
+          </p:cNvSpPr>
+          <p:nvPr>
+            <p:ph idx="1"/>
+          </p:nvPr>
+        </p:nvSpPr>
+        <p:spPr>
+          <a:xfrm>
+            <a:off x="8186895" y="2531672"/>
+            <a:ext cx="3355942" cy="1794656"/>
+          </a:xfrm>
+        </p:spPr>
+        <p:txBody>
+          <a:bodyPr vert="horz" lIns="91440" tIns="45720" rIns="91440" bIns="45720" rtlCol="0">
+            <a:normAutofit/>
+          </a:bodyPr>
+          <a:lstStyle/>
+          <a:p>
+            <a:pPr marL="0" indent="0" algn="ctr">
+              <a:lnSpc>
+                <a:spcPct val="112000"/>
+              </a:lnSpc>
+              <a:spcBef>
+                <a:spcPts val="0"/>
+              </a:spcBef>
+              <a:spcAft>
+                <a:spcPts val="600"/>
+              </a:spcAft>
+              <a:buNone/>
+            </a:pPr>
+            <a:r>
+              <a:rPr lang="en-US" sz="6000" b="1" dirty="0"/>
+              <a:t>THANKS</a:t>
+            </a:r>
+          </a:p>
+        </p:txBody>
+      </p:sp>
+      <p:sp>
+        <p:nvSpPr>
+          <p:cNvPr id="18" name="Freeform 6">
+            <a:extLst>
+              <a:ext uri="{FF2B5EF4-FFF2-40B4-BE49-F238E27FC236}">
+                <a16:creationId xmlns:a16="http://schemas.microsoft.com/office/drawing/2014/main" id="{BA5783C3-2F96-40A7-A24F-30CB07AA3928}"/>
+              </a:ext>
+              <a:ext uri="{C183D7F6-B498-43B3-948B-1728B52AA6E4}">
+                <adec:decorative xmlns:adec="http://schemas.microsoft.com/office/drawing/2017/decorative" val="1"/>
+              </a:ext>
+            </a:extLst>
+          </p:cNvPr>
+          <p:cNvSpPr>
+            <a:spLocks noGrp="1" noRot="1" noChangeAspect="1" noMove="1" noResize="1" noEditPoints="1" noAdjustHandles="1" noChangeArrowheads="1" noChangeShapeType="1" noTextEdit="1"/>
+          </p:cNvSpPr>
+          <p:nvPr>
+            <p:extLst>
+              <p:ext uri="{386F3935-93C4-4BCD-93E2-E3B085C9AB24}">
+                <p16:designElem xmlns:p16="http://schemas.microsoft.com/office/powerpoint/2015/main" val="1"/>
+              </p:ext>
+            </p:extLst>
+          </p:nvPr>
+        </p:nvSpPr>
+        <p:spPr bwMode="auto">
+          <a:xfrm flipH="1" flipV="1">
+            <a:off x="649163" y="634028"/>
+            <a:ext cx="3275668" cy="4408488"/>
+          </a:xfrm>
+          <a:custGeom>
+            <a:avLst/>
+            <a:gdLst/>
+            <a:ahLst/>
+            <a:cxnLst/>
+            <a:rect l="l" t="t" r="r" b="b"/>
+            <a:pathLst>
+              <a:path w="10002" h="10000">
+                <a:moveTo>
+                  <a:pt x="8763" y="0"/>
+                </a:moveTo>
+                <a:lnTo>
+                  <a:pt x="10002" y="0"/>
+                </a:lnTo>
+                <a:lnTo>
+                  <a:pt x="10002" y="10000"/>
+                </a:lnTo>
+                <a:lnTo>
+                  <a:pt x="2" y="10000"/>
+                </a:lnTo>
+                <a:cubicBezTo>
+                  <a:pt x="-2" y="9698"/>
+                  <a:pt x="4" y="9427"/>
+                  <a:pt x="0" y="9125"/>
+                </a:cubicBezTo>
+                <a:lnTo>
+                  <a:pt x="8763" y="9128"/>
+                </a:lnTo>
+                <a:lnTo>
+                  <a:pt x="8763" y="0"/>
+                </a:lnTo>
+                <a:close/>
+              </a:path>
+            </a:pathLst>
+          </a:custGeom>
+          <a:solidFill>
+            <a:schemeClr val="tx2"/>
+          </a:solidFill>
+          <a:ln w="0">
+            <a:noFill/>
+            <a:prstDash val="solid"/>
+            <a:round/>
+            <a:headEnd/>
+            <a:tailEnd/>
+          </a:ln>
+        </p:spPr>
+      </p:sp>
+      <p:sp>
+        <p:nvSpPr>
+          <p:cNvPr id="20" name="Freeform 6">
+            <a:extLst>
+              <a:ext uri="{FF2B5EF4-FFF2-40B4-BE49-F238E27FC236}">
+                <a16:creationId xmlns:a16="http://schemas.microsoft.com/office/drawing/2014/main" id="{A9D08DBA-0326-4C4E-ACFB-576F3ABDD2D0}"/>
+              </a:ext>
+              <a:ext uri="{C183D7F6-B498-43B3-948B-1728B52AA6E4}">
+                <adec:decorative xmlns:adec="http://schemas.microsoft.com/office/drawing/2017/decorative" val="1"/>
+              </a:ext>
+            </a:extLst>
+          </p:cNvPr>
+          <p:cNvSpPr>
+            <a:spLocks noGrp="1" noRot="1" noChangeAspect="1" noMove="1" noResize="1" noEditPoints="1" noAdjustHandles="1" noChangeArrowheads="1" noChangeShapeType="1" noTextEdit="1"/>
+          </p:cNvSpPr>
+          <p:nvPr>
+            <p:extLst>
+              <p:ext uri="{386F3935-93C4-4BCD-93E2-E3B085C9AB24}">
+                <p16:designElem xmlns:p16="http://schemas.microsoft.com/office/powerpoint/2015/main" val="1"/>
+              </p:ext>
+            </p:extLst>
+          </p:nvPr>
+        </p:nvSpPr>
+        <p:spPr bwMode="auto">
+          <a:xfrm>
+            <a:off x="4494670" y="2016617"/>
+            <a:ext cx="3275013" cy="4408488"/>
+          </a:xfrm>
+          <a:custGeom>
+            <a:avLst/>
+            <a:gdLst/>
+            <a:ahLst/>
+            <a:cxnLst/>
+            <a:rect l="l" t="t" r="r" b="b"/>
+            <a:pathLst>
+              <a:path w="10000" h="10000">
+                <a:moveTo>
+                  <a:pt x="8761" y="0"/>
+                </a:moveTo>
+                <a:lnTo>
+                  <a:pt x="10000" y="0"/>
+                </a:lnTo>
+                <a:lnTo>
+                  <a:pt x="10000" y="10000"/>
+                </a:lnTo>
+                <a:lnTo>
+                  <a:pt x="0" y="10000"/>
+                </a:lnTo>
+                <a:lnTo>
+                  <a:pt x="0" y="9126"/>
+                </a:lnTo>
+                <a:lnTo>
+                  <a:pt x="8761" y="9127"/>
+                </a:lnTo>
+                <a:lnTo>
+                  <a:pt x="8761" y="0"/>
+                </a:lnTo>
+                <a:close/>
+              </a:path>
+            </a:pathLst>
+          </a:custGeom>
+          <a:solidFill>
+            <a:schemeClr val="tx2"/>
+          </a:solidFill>
+          <a:ln w="0">
+            <a:noFill/>
+            <a:prstDash val="solid"/>
+            <a:round/>
+            <a:headEnd/>
+            <a:tailEnd/>
+          </a:ln>
+        </p:spPr>
+      </p:sp>
+      <p:pic>
+        <p:nvPicPr>
+          <p:cNvPr id="7" name="Graphic 6">
+            <a:extLst>
+              <a:ext uri="{FF2B5EF4-FFF2-40B4-BE49-F238E27FC236}">
+                <a16:creationId xmlns:a16="http://schemas.microsoft.com/office/drawing/2014/main" id="{9BE8F7AB-5204-4F25-B0A4-63203AB5D424}"/>
+              </a:ext>
+            </a:extLst>
+          </p:cNvPr>
+          <p:cNvPicPr>
+            <a:picLocks noChangeAspect="1"/>
+          </p:cNvPicPr>
+          <p:nvPr/>
+        </p:nvPicPr>
+        <p:blipFill>
+          <a:blip r:embed="rId2">
+            <a:extLst>
+              <a:ext uri="{96DAC541-7B7A-43D3-8B79-37D633B846F1}">
+                <asvg:svgBlip xmlns:asvg="http://schemas.microsoft.com/office/drawing/2016/SVG/main" r:embed="rId3"/>
+              </a:ext>
+            </a:extLst>
+          </a:blip>
+          <a:stretch>
+            <a:fillRect/>
+          </a:stretch>
+        </p:blipFill>
+        <p:spPr>
+          <a:xfrm>
+            <a:off x="2020879" y="1340841"/>
+            <a:ext cx="4375510" cy="4375510"/>
+          </a:xfrm>
+          <a:prstGeom prst="rect">
+            <a:avLst/>
+          </a:prstGeom>
+        </p:spPr>
+      </p:pic>
+    </p:spTree>
+    <p:extLst>
+      <p:ext uri="{BB962C8B-B14F-4D97-AF65-F5344CB8AC3E}">
+        <p14:creationId xmlns:p14="http://schemas.microsoft.com/office/powerpoint/2010/main" val="3555016238"/>
+      </p:ext>
+    </p:extLst>
+  </p:cSld>
+  <p:clrMapOvr>
+    <a:masterClrMapping/>
+  </p:clrMapOvr>
+</p:sld>
+</file>
+
 <file path=ppt/slides/slide2.xml><?xml version="1.0" encoding="utf-8"?>
 <p:sld xmlns:a="http://schemas.openxmlformats.org/drawingml/2006/main" xmlns:r="http://schemas.openxmlformats.org/officeDocument/2006/relationships" xmlns:p="http://schemas.openxmlformats.org/presentationml/2006/main">
   <p:cSld>
@@ -4849,10 +6383,10 @@
       </p:sp>
       <p:sp>
         <p:nvSpPr>
-          <p:cNvPr id="63" name="Title 1">
+          <p:cNvPr id="65" name="Title 64">
             <a:extLst>
               <a:ext uri="{FF2B5EF4-FFF2-40B4-BE49-F238E27FC236}">
-                <a16:creationId xmlns:a16="http://schemas.microsoft.com/office/drawing/2014/main" id="{A5444FFF-5AD7-4B23-97F5-5A6FE511B770}"/>
+                <a16:creationId xmlns:a16="http://schemas.microsoft.com/office/drawing/2014/main" id="{317052C1-EF15-49C3-8F75-D203D8721095}"/>
               </a:ext>
             </a:extLst>
           </p:cNvPr>
@@ -4863,53 +6397,68 @@
             <p:ph type="title"/>
           </p:nvPr>
         </p:nvSpPr>
-        <p:spPr>
-          <a:xfrm>
-            <a:off x="1371600" y="685800"/>
-            <a:ext cx="9601200" cy="1485900"/>
-          </a:xfrm>
-        </p:spPr>
+        <p:spPr/>
         <p:txBody>
           <a:bodyPr/>
           <a:lstStyle/>
           <a:p>
+            <a:endParaRPr lang="en-IN"/>
+          </a:p>
+        </p:txBody>
+      </p:sp>
+      <p:sp>
+        <p:nvSpPr>
+          <p:cNvPr id="66" name="Title 1">
+            <a:extLst>
+              <a:ext uri="{FF2B5EF4-FFF2-40B4-BE49-F238E27FC236}">
+                <a16:creationId xmlns:a16="http://schemas.microsoft.com/office/drawing/2014/main" id="{A5E772BD-58AC-449C-804B-34B1D88FA6B3}"/>
+              </a:ext>
+            </a:extLst>
+          </p:cNvPr>
+          <p:cNvSpPr txBox="1">
+            <a:spLocks/>
+          </p:cNvSpPr>
+          <p:nvPr/>
+        </p:nvSpPr>
+        <p:spPr>
+          <a:xfrm>
+            <a:off x="1524000" y="838200"/>
+            <a:ext cx="9601200" cy="1485900"/>
+          </a:xfrm>
+          <a:prstGeom prst="rect">
+            <a:avLst/>
+          </a:prstGeom>
+        </p:spPr>
+        <p:txBody>
+          <a:bodyPr vert="horz" lIns="91440" tIns="45720" rIns="91440" bIns="45720" rtlCol="0" anchor="t">
+            <a:normAutofit/>
+          </a:bodyPr>
+          <a:lstStyle>
+            <a:lvl1pPr algn="l" defTabSz="914400" rtl="0" eaLnBrk="1" latinLnBrk="0" hangingPunct="1">
+              <a:lnSpc>
+                <a:spcPct val="89000"/>
+              </a:lnSpc>
+              <a:spcBef>
+                <a:spcPct val="0"/>
+              </a:spcBef>
+              <a:buNone/>
+              <a:defRPr sz="4400" kern="1200" baseline="0">
+                <a:solidFill>
+                  <a:schemeClr val="tx2"/>
+                </a:solidFill>
+                <a:latin typeface="+mj-lt"/>
+                <a:ea typeface="+mj-ea"/>
+                <a:cs typeface="+mj-cs"/>
+              </a:defRPr>
+            </a:lvl1pPr>
+          </a:lstStyle>
+          <a:p>
             <a:pPr algn="ctr"/>
             <a:r>
-              <a:rPr lang="en-IN" dirty="0">
-                <a:ln>
-                  <a:gradFill>
-                    <a:gsLst>
-                      <a:gs pos="0">
-                        <a:schemeClr val="accent1">
-                          <a:lumMod val="5000"/>
-                          <a:lumOff val="95000"/>
-                        </a:schemeClr>
-                      </a:gs>
-                      <a:gs pos="26000">
-                        <a:schemeClr val="accent1">
-                          <a:lumMod val="45000"/>
-                          <a:lumOff val="55000"/>
-                        </a:schemeClr>
-                      </a:gs>
-                      <a:gs pos="83000">
-                        <a:schemeClr val="accent1">
-                          <a:lumMod val="45000"/>
-                          <a:lumOff val="55000"/>
-                        </a:schemeClr>
-                      </a:gs>
-                      <a:gs pos="100000">
-                        <a:schemeClr val="accent1">
-                          <a:lumMod val="30000"/>
-                          <a:lumOff val="70000"/>
-                        </a:schemeClr>
-                      </a:gs>
-                    </a:gsLst>
-                    <a:lin ang="5400000" scaled="1"/>
-                  </a:gradFill>
-                </a:ln>
-              </a:rPr>
-              <a:t>Pipeline</a:t>
-            </a:r>
+              <a:rPr lang="en-IN"/>
+              <a:t>MOTIVATION</a:t>
+            </a:r>
+            <a:endParaRPr lang="en-IN" dirty="0"/>
           </a:p>
         </p:txBody>
       </p:sp>
@@ -4917,6 +6466,1038 @@
     <p:extLst>
       <p:ext uri="{BB962C8B-B14F-4D97-AF65-F5344CB8AC3E}">
         <p14:creationId xmlns:p14="http://schemas.microsoft.com/office/powerpoint/2010/main" val="315750009"/>
+      </p:ext>
+    </p:extLst>
+  </p:cSld>
+  <p:clrMapOvr>
+    <a:masterClrMapping/>
+  </p:clrMapOvr>
+</p:sld>
+</file>
+
+<file path=ppt/slides/slide4.xml><?xml version="1.0" encoding="utf-8"?>
+<p:sld xmlns:a="http://schemas.openxmlformats.org/drawingml/2006/main" xmlns:r="http://schemas.openxmlformats.org/officeDocument/2006/relationships" xmlns:p="http://schemas.openxmlformats.org/presentationml/2006/main">
+  <p:cSld>
+    <p:bg>
+      <p:bgPr>
+        <a:solidFill>
+          <a:schemeClr val="bg2"/>
+        </a:solidFill>
+        <a:effectLst/>
+      </p:bgPr>
+    </p:bg>
+    <p:spTree>
+      <p:nvGrpSpPr>
+        <p:cNvPr id="1" name=""/>
+        <p:cNvGrpSpPr/>
+        <p:nvPr/>
+      </p:nvGrpSpPr>
+      <p:grpSpPr>
+        <a:xfrm>
+          <a:off x="0" y="0"/>
+          <a:ext cx="0" cy="0"/>
+          <a:chOff x="0" y="0"/>
+          <a:chExt cx="0" cy="0"/>
+        </a:xfrm>
+      </p:grpSpPr>
+      <p:sp>
+        <p:nvSpPr>
+          <p:cNvPr id="10" name="Rectangle 9">
+            <a:extLst>
+              <a:ext uri="{FF2B5EF4-FFF2-40B4-BE49-F238E27FC236}">
+                <a16:creationId xmlns:a16="http://schemas.microsoft.com/office/drawing/2014/main" id="{AA6EC888-B85F-410F-B430-06583E94BEEC}"/>
+              </a:ext>
+              <a:ext uri="{C183D7F6-B498-43B3-948B-1728B52AA6E4}">
+                <adec:decorative xmlns:adec="http://schemas.microsoft.com/office/drawing/2017/decorative" val="1"/>
+              </a:ext>
+            </a:extLst>
+          </p:cNvPr>
+          <p:cNvSpPr>
+            <a:spLocks noGrp="1" noRot="1" noChangeAspect="1" noMove="1" noResize="1" noEditPoints="1" noAdjustHandles="1" noChangeArrowheads="1" noChangeShapeType="1" noTextEdit="1"/>
+          </p:cNvSpPr>
+          <p:nvPr>
+            <p:extLst>
+              <p:ext uri="{386F3935-93C4-4BCD-93E2-E3B085C9AB24}">
+                <p16:designElem xmlns:p16="http://schemas.microsoft.com/office/powerpoint/2015/main" val="1"/>
+              </p:ext>
+            </p:extLst>
+          </p:nvPr>
+        </p:nvSpPr>
+        <p:spPr>
+          <a:xfrm>
+            <a:off x="478095" y="376"/>
+            <a:ext cx="228600" cy="6858000"/>
+          </a:xfrm>
+          <a:prstGeom prst="rect">
+            <a:avLst/>
+          </a:prstGeom>
+          <a:solidFill>
+            <a:schemeClr val="tx2"/>
+          </a:solidFill>
+          <a:ln>
+            <a:noFill/>
+          </a:ln>
+        </p:spPr>
+        <p:style>
+          <a:lnRef idx="2">
+            <a:schemeClr val="accent1">
+              <a:shade val="50000"/>
+            </a:schemeClr>
+          </a:lnRef>
+          <a:fillRef idx="1">
+            <a:schemeClr val="accent1"/>
+          </a:fillRef>
+          <a:effectRef idx="0">
+            <a:schemeClr val="accent1"/>
+          </a:effectRef>
+          <a:fontRef idx="minor">
+            <a:schemeClr val="lt1"/>
+          </a:fontRef>
+        </p:style>
+      </p:sp>
+      <p:sp>
+        <p:nvSpPr>
+          <p:cNvPr id="12" name="Rectangle 11">
+            <a:extLst>
+              <a:ext uri="{FF2B5EF4-FFF2-40B4-BE49-F238E27FC236}">
+                <a16:creationId xmlns:a16="http://schemas.microsoft.com/office/drawing/2014/main" id="{D488911C-0EC7-40A9-9BCB-CA8A66E4623A}"/>
+              </a:ext>
+              <a:ext uri="{C183D7F6-B498-43B3-948B-1728B52AA6E4}">
+                <adec:decorative xmlns:adec="http://schemas.microsoft.com/office/drawing/2017/decorative" val="1"/>
+              </a:ext>
+            </a:extLst>
+          </p:cNvPr>
+          <p:cNvSpPr>
+            <a:spLocks noGrp="1" noRot="1" noChangeAspect="1" noMove="1" noResize="1" noEditPoints="1" noAdjustHandles="1" noChangeArrowheads="1" noChangeShapeType="1" noTextEdit="1"/>
+          </p:cNvSpPr>
+          <p:nvPr>
+            <p:extLst>
+              <p:ext uri="{386F3935-93C4-4BCD-93E2-E3B085C9AB24}">
+                <p16:designElem xmlns:p16="http://schemas.microsoft.com/office/powerpoint/2015/main" val="1"/>
+              </p:ext>
+            </p:extLst>
+          </p:nvPr>
+        </p:nvSpPr>
+        <p:spPr>
+          <a:xfrm>
+            <a:off x="0" y="0"/>
+            <a:ext cx="12192000" cy="6858000"/>
+          </a:xfrm>
+          <a:prstGeom prst="rect">
+            <a:avLst/>
+          </a:prstGeom>
+          <a:solidFill>
+            <a:schemeClr val="bg2"/>
+          </a:solidFill>
+          <a:ln>
+            <a:noFill/>
+          </a:ln>
+        </p:spPr>
+        <p:style>
+          <a:lnRef idx="2">
+            <a:schemeClr val="accent1">
+              <a:shade val="50000"/>
+            </a:schemeClr>
+          </a:lnRef>
+          <a:fillRef idx="1">
+            <a:schemeClr val="accent1"/>
+          </a:fillRef>
+          <a:effectRef idx="0">
+            <a:schemeClr val="accent1"/>
+          </a:effectRef>
+          <a:fontRef idx="minor">
+            <a:schemeClr val="lt1"/>
+          </a:fontRef>
+        </p:style>
+        <p:txBody>
+          <a:bodyPr rtlCol="0" anchor="ctr"/>
+          <a:lstStyle/>
+          <a:p>
+            <a:pPr algn="ctr"/>
+            <a:endParaRPr lang="en-US"/>
+          </a:p>
+        </p:txBody>
+      </p:sp>
+      <p:grpSp>
+        <p:nvGrpSpPr>
+          <p:cNvPr id="14" name="Group 13">
+            <a:extLst>
+              <a:ext uri="{FF2B5EF4-FFF2-40B4-BE49-F238E27FC236}">
+                <a16:creationId xmlns:a16="http://schemas.microsoft.com/office/drawing/2014/main" id="{53023EA8-527A-4FA2-A71D-626F912756C6}"/>
+              </a:ext>
+              <a:ext uri="{C183D7F6-B498-43B3-948B-1728B52AA6E4}">
+                <adec:decorative xmlns:adec="http://schemas.microsoft.com/office/drawing/2017/decorative" val="1"/>
+              </a:ext>
+            </a:extLst>
+          </p:cNvPr>
+          <p:cNvGrpSpPr>
+            <a:grpSpLocks noGrp="1" noUngrp="1" noRot="1" noChangeAspect="1" noMove="1" noResize="1"/>
+          </p:cNvGrpSpPr>
+          <p:nvPr>
+            <p:extLst>
+              <p:ext uri="{386F3935-93C4-4BCD-93E2-E3B085C9AB24}">
+                <p16:designElem xmlns:p16="http://schemas.microsoft.com/office/powerpoint/2015/main" val="1"/>
+              </p:ext>
+            </p:extLst>
+          </p:nvPr>
+        </p:nvGrpSpPr>
+        <p:grpSpPr>
+          <a:xfrm>
+            <a:off x="752858" y="744469"/>
+            <a:ext cx="10674117" cy="5349671"/>
+            <a:chOff x="752858" y="744469"/>
+            <a:chExt cx="10674117" cy="5349671"/>
+          </a:xfrm>
+        </p:grpSpPr>
+        <p:sp>
+          <p:nvSpPr>
+            <p:cNvPr id="15" name="Freeform 6">
+              <a:extLst>
+                <a:ext uri="{FF2B5EF4-FFF2-40B4-BE49-F238E27FC236}">
+                  <a16:creationId xmlns:a16="http://schemas.microsoft.com/office/drawing/2014/main" id="{60C46CD6-ADBB-41BC-8969-7C707D4332ED}"/>
+                </a:ext>
+                <a:ext uri="{C183D7F6-B498-43B3-948B-1728B52AA6E4}">
+                  <adec:decorative xmlns:adec="http://schemas.microsoft.com/office/drawing/2017/decorative" val="1"/>
+                </a:ext>
+              </a:extLst>
+            </p:cNvPr>
+            <p:cNvSpPr/>
+            <p:nvPr>
+              <p:extLst>
+                <p:ext uri="{386F3935-93C4-4BCD-93E2-E3B085C9AB24}">
+                  <p16:designElem xmlns:p16="http://schemas.microsoft.com/office/powerpoint/2015/main" val="1"/>
+                </p:ext>
+              </p:extLst>
+            </p:nvPr>
+          </p:nvSpPr>
+          <p:spPr bwMode="auto">
+            <a:xfrm>
+              <a:off x="8151962" y="1685652"/>
+              <a:ext cx="3275013" cy="4408488"/>
+            </a:xfrm>
+            <a:custGeom>
+              <a:avLst/>
+              <a:gdLst/>
+              <a:ahLst/>
+              <a:cxnLst/>
+              <a:rect l="l" t="t" r="r" b="b"/>
+              <a:pathLst>
+                <a:path w="10000" h="10000">
+                  <a:moveTo>
+                    <a:pt x="8761" y="0"/>
+                  </a:moveTo>
+                  <a:lnTo>
+                    <a:pt x="10000" y="0"/>
+                  </a:lnTo>
+                  <a:lnTo>
+                    <a:pt x="10000" y="10000"/>
+                  </a:lnTo>
+                  <a:lnTo>
+                    <a:pt x="0" y="10000"/>
+                  </a:lnTo>
+                  <a:lnTo>
+                    <a:pt x="0" y="9126"/>
+                  </a:lnTo>
+                  <a:lnTo>
+                    <a:pt x="8761" y="9127"/>
+                  </a:lnTo>
+                  <a:lnTo>
+                    <a:pt x="8761" y="0"/>
+                  </a:lnTo>
+                  <a:close/>
+                </a:path>
+              </a:pathLst>
+            </a:custGeom>
+            <a:solidFill>
+              <a:schemeClr val="tx2"/>
+            </a:solidFill>
+            <a:ln w="0">
+              <a:noFill/>
+              <a:prstDash val="solid"/>
+              <a:round/>
+              <a:headEnd/>
+              <a:tailEnd/>
+            </a:ln>
+          </p:spPr>
+        </p:sp>
+        <p:sp>
+          <p:nvSpPr>
+            <p:cNvPr id="16" name="Freeform 6">
+              <a:extLst>
+                <a:ext uri="{FF2B5EF4-FFF2-40B4-BE49-F238E27FC236}">
+                  <a16:creationId xmlns:a16="http://schemas.microsoft.com/office/drawing/2014/main" id="{B6C38415-998B-45FB-A12C-BD0B184CB805}"/>
+                </a:ext>
+                <a:ext uri="{C183D7F6-B498-43B3-948B-1728B52AA6E4}">
+                  <adec:decorative xmlns:adec="http://schemas.microsoft.com/office/drawing/2017/decorative" val="1"/>
+                </a:ext>
+              </a:extLst>
+            </p:cNvPr>
+            <p:cNvSpPr/>
+            <p:nvPr>
+              <p:extLst>
+                <p:ext uri="{386F3935-93C4-4BCD-93E2-E3B085C9AB24}">
+                  <p16:designElem xmlns:p16="http://schemas.microsoft.com/office/powerpoint/2015/main" val="1"/>
+                </p:ext>
+              </p:extLst>
+            </p:nvPr>
+          </p:nvSpPr>
+          <p:spPr bwMode="auto">
+            <a:xfrm flipH="1" flipV="1">
+              <a:off x="752858" y="744469"/>
+              <a:ext cx="3275668" cy="4408488"/>
+            </a:xfrm>
+            <a:custGeom>
+              <a:avLst/>
+              <a:gdLst/>
+              <a:ahLst/>
+              <a:cxnLst/>
+              <a:rect l="l" t="t" r="r" b="b"/>
+              <a:pathLst>
+                <a:path w="10002" h="10000">
+                  <a:moveTo>
+                    <a:pt x="8763" y="0"/>
+                  </a:moveTo>
+                  <a:lnTo>
+                    <a:pt x="10002" y="0"/>
+                  </a:lnTo>
+                  <a:lnTo>
+                    <a:pt x="10002" y="10000"/>
+                  </a:lnTo>
+                  <a:lnTo>
+                    <a:pt x="2" y="10000"/>
+                  </a:lnTo>
+                  <a:cubicBezTo>
+                    <a:pt x="-2" y="9698"/>
+                    <a:pt x="4" y="9427"/>
+                    <a:pt x="0" y="9125"/>
+                  </a:cubicBezTo>
+                  <a:lnTo>
+                    <a:pt x="8763" y="9128"/>
+                  </a:lnTo>
+                  <a:lnTo>
+                    <a:pt x="8763" y="0"/>
+                  </a:lnTo>
+                  <a:close/>
+                </a:path>
+              </a:pathLst>
+            </a:custGeom>
+            <a:solidFill>
+              <a:schemeClr val="tx2"/>
+            </a:solidFill>
+            <a:ln w="0">
+              <a:noFill/>
+              <a:prstDash val="solid"/>
+              <a:round/>
+              <a:headEnd/>
+              <a:tailEnd/>
+            </a:ln>
+          </p:spPr>
+        </p:sp>
+      </p:grpSp>
+      <p:sp>
+        <p:nvSpPr>
+          <p:cNvPr id="18" name="Rectangle 17">
+            <a:extLst>
+              <a:ext uri="{FF2B5EF4-FFF2-40B4-BE49-F238E27FC236}">
+                <a16:creationId xmlns:a16="http://schemas.microsoft.com/office/drawing/2014/main" id="{C8D89F71-9459-4318-ACAE-874616C3ADAD}"/>
+              </a:ext>
+              <a:ext uri="{C183D7F6-B498-43B3-948B-1728B52AA6E4}">
+                <adec:decorative xmlns:adec="http://schemas.microsoft.com/office/drawing/2017/decorative" val="1"/>
+              </a:ext>
+            </a:extLst>
+          </p:cNvPr>
+          <p:cNvSpPr>
+            <a:spLocks noGrp="1" noRot="1" noChangeAspect="1" noMove="1" noResize="1" noEditPoints="1" noAdjustHandles="1" noChangeArrowheads="1" noChangeShapeType="1" noTextEdit="1"/>
+          </p:cNvSpPr>
+          <p:nvPr>
+            <p:extLst>
+              <p:ext uri="{386F3935-93C4-4BCD-93E2-E3B085C9AB24}">
+                <p16:designElem xmlns:p16="http://schemas.microsoft.com/office/powerpoint/2015/main" val="1"/>
+              </p:ext>
+            </p:extLst>
+          </p:nvPr>
+        </p:nvSpPr>
+        <p:spPr>
+          <a:xfrm>
+            <a:off x="1000462" y="968188"/>
+            <a:ext cx="10194046" cy="4894232"/>
+          </a:xfrm>
+          <a:prstGeom prst="rect">
+            <a:avLst/>
+          </a:prstGeom>
+          <a:solidFill>
+            <a:srgbClr val="FFFFFF"/>
+          </a:solidFill>
+          <a:ln>
+            <a:noFill/>
+          </a:ln>
+        </p:spPr>
+        <p:style>
+          <a:lnRef idx="2">
+            <a:schemeClr val="accent1">
+              <a:shade val="50000"/>
+            </a:schemeClr>
+          </a:lnRef>
+          <a:fillRef idx="1">
+            <a:schemeClr val="accent1"/>
+          </a:fillRef>
+          <a:effectRef idx="0">
+            <a:schemeClr val="accent1"/>
+          </a:effectRef>
+          <a:fontRef idx="minor">
+            <a:schemeClr val="lt1"/>
+          </a:fontRef>
+        </p:style>
+        <p:txBody>
+          <a:bodyPr rtlCol="0" anchor="ctr"/>
+          <a:lstStyle/>
+          <a:p>
+            <a:pPr algn="ctr"/>
+            <a:endParaRPr lang="en-US"/>
+          </a:p>
+        </p:txBody>
+      </p:sp>
+      <p:pic>
+        <p:nvPicPr>
+          <p:cNvPr id="9" name="Content Placeholder 8">
+            <a:extLst>
+              <a:ext uri="{FF2B5EF4-FFF2-40B4-BE49-F238E27FC236}">
+                <a16:creationId xmlns:a16="http://schemas.microsoft.com/office/drawing/2014/main" id="{9F40C73B-D581-4997-89E7-C956D1F16BE3}"/>
+              </a:ext>
+            </a:extLst>
+          </p:cNvPr>
+          <p:cNvPicPr>
+            <a:picLocks noGrp="1" noChangeAspect="1"/>
+          </p:cNvPicPr>
+          <p:nvPr>
+            <p:ph idx="1"/>
+          </p:nvPr>
+        </p:nvPicPr>
+        <p:blipFill>
+          <a:blip r:embed="rId2"/>
+          <a:stretch>
+            <a:fillRect/>
+          </a:stretch>
+        </p:blipFill>
+        <p:spPr>
+          <a:xfrm>
+            <a:off x="3032644" y="1342842"/>
+            <a:ext cx="5696251" cy="3581400"/>
+          </a:xfrm>
+        </p:spPr>
+      </p:pic>
+      <p:sp>
+        <p:nvSpPr>
+          <p:cNvPr id="34" name="Title 1">
+            <a:extLst>
+              <a:ext uri="{FF2B5EF4-FFF2-40B4-BE49-F238E27FC236}">
+                <a16:creationId xmlns:a16="http://schemas.microsoft.com/office/drawing/2014/main" id="{9A667326-B432-4AD5-9906-36883260C2E0}"/>
+              </a:ext>
+            </a:extLst>
+          </p:cNvPr>
+          <p:cNvSpPr>
+            <a:spLocks noGrp="1"/>
+          </p:cNvSpPr>
+          <p:nvPr>
+            <p:ph type="title"/>
+          </p:nvPr>
+        </p:nvSpPr>
+        <p:spPr>
+          <a:xfrm>
+            <a:off x="1295400" y="149020"/>
+            <a:ext cx="9601200" cy="1485900"/>
+          </a:xfrm>
+        </p:spPr>
+        <p:txBody>
+          <a:bodyPr/>
+          <a:lstStyle/>
+          <a:p>
+            <a:pPr algn="ctr"/>
+            <a:r>
+              <a:rPr lang="en-IN" dirty="0"/>
+              <a:t>TECH STACK</a:t>
+            </a:r>
+          </a:p>
+        </p:txBody>
+      </p:sp>
+    </p:spTree>
+    <p:extLst>
+      <p:ext uri="{BB962C8B-B14F-4D97-AF65-F5344CB8AC3E}">
+        <p14:creationId xmlns:p14="http://schemas.microsoft.com/office/powerpoint/2010/main" val="596273305"/>
+      </p:ext>
+    </p:extLst>
+  </p:cSld>
+  <p:clrMapOvr>
+    <a:masterClrMapping/>
+  </p:clrMapOvr>
+</p:sld>
+</file>
+
+<file path=ppt/slides/slide5.xml><?xml version="1.0" encoding="utf-8"?>
+<p:sld xmlns:a="http://schemas.openxmlformats.org/drawingml/2006/main" xmlns:r="http://schemas.openxmlformats.org/officeDocument/2006/relationships" xmlns:p="http://schemas.openxmlformats.org/presentationml/2006/main">
+  <p:cSld>
+    <p:spTree>
+      <p:nvGrpSpPr>
+        <p:cNvPr id="1" name=""/>
+        <p:cNvGrpSpPr/>
+        <p:nvPr/>
+      </p:nvGrpSpPr>
+      <p:grpSpPr>
+        <a:xfrm>
+          <a:off x="0" y="0"/>
+          <a:ext cx="0" cy="0"/>
+          <a:chOff x="0" y="0"/>
+          <a:chExt cx="0" cy="0"/>
+        </a:xfrm>
+      </p:grpSpPr>
+      <p:sp>
+        <p:nvSpPr>
+          <p:cNvPr id="2" name="Title 1">
+            <a:extLst>
+              <a:ext uri="{FF2B5EF4-FFF2-40B4-BE49-F238E27FC236}">
+                <a16:creationId xmlns:a16="http://schemas.microsoft.com/office/drawing/2014/main" id="{98FD3588-4BCC-4FE1-B3E4-7C0D41DC6BA0}"/>
+              </a:ext>
+            </a:extLst>
+          </p:cNvPr>
+          <p:cNvSpPr>
+            <a:spLocks noGrp="1"/>
+          </p:cNvSpPr>
+          <p:nvPr>
+            <p:ph type="title"/>
+          </p:nvPr>
+        </p:nvSpPr>
+        <p:spPr>
+          <a:xfrm>
+            <a:off x="1295400" y="3118608"/>
+            <a:ext cx="9601200" cy="1485900"/>
+          </a:xfrm>
+        </p:spPr>
+        <p:txBody>
+          <a:bodyPr>
+            <a:normAutofit/>
+          </a:bodyPr>
+          <a:lstStyle/>
+          <a:p>
+            <a:pPr algn="ctr"/>
+            <a:r>
+              <a:rPr lang="en-IN" sz="8800" dirty="0"/>
+              <a:t>ETL</a:t>
+            </a:r>
+          </a:p>
+        </p:txBody>
+      </p:sp>
+    </p:spTree>
+    <p:extLst>
+      <p:ext uri="{BB962C8B-B14F-4D97-AF65-F5344CB8AC3E}">
+        <p14:creationId xmlns:p14="http://schemas.microsoft.com/office/powerpoint/2010/main" val="2004363046"/>
+      </p:ext>
+    </p:extLst>
+  </p:cSld>
+  <p:clrMapOvr>
+    <a:masterClrMapping/>
+  </p:clrMapOvr>
+</p:sld>
+</file>
+
+<file path=ppt/slides/slide6.xml><?xml version="1.0" encoding="utf-8"?>
+<p:sld xmlns:a="http://schemas.openxmlformats.org/drawingml/2006/main" xmlns:r="http://schemas.openxmlformats.org/officeDocument/2006/relationships" xmlns:p="http://schemas.openxmlformats.org/presentationml/2006/main">
+  <p:cSld>
+    <p:spTree>
+      <p:nvGrpSpPr>
+        <p:cNvPr id="1" name=""/>
+        <p:cNvGrpSpPr/>
+        <p:nvPr/>
+      </p:nvGrpSpPr>
+      <p:grpSpPr>
+        <a:xfrm>
+          <a:off x="0" y="0"/>
+          <a:ext cx="0" cy="0"/>
+          <a:chOff x="0" y="0"/>
+          <a:chExt cx="0" cy="0"/>
+        </a:xfrm>
+      </p:grpSpPr>
+      <p:sp>
+        <p:nvSpPr>
+          <p:cNvPr id="2" name="Title 1">
+            <a:extLst>
+              <a:ext uri="{FF2B5EF4-FFF2-40B4-BE49-F238E27FC236}">
+                <a16:creationId xmlns:a16="http://schemas.microsoft.com/office/drawing/2014/main" id="{279D93D6-37E3-496D-B4B4-D731921F6C52}"/>
+              </a:ext>
+            </a:extLst>
+          </p:cNvPr>
+          <p:cNvSpPr>
+            <a:spLocks noGrp="1"/>
+          </p:cNvSpPr>
+          <p:nvPr>
+            <p:ph type="title"/>
+          </p:nvPr>
+        </p:nvSpPr>
+        <p:spPr/>
+        <p:txBody>
+          <a:bodyPr/>
+          <a:lstStyle/>
+          <a:p>
+            <a:pPr algn="ctr"/>
+            <a:r>
+              <a:rPr lang="en-IN" dirty="0"/>
+              <a:t>EXTRACT</a:t>
+            </a:r>
+          </a:p>
+        </p:txBody>
+      </p:sp>
+      <p:sp>
+        <p:nvSpPr>
+          <p:cNvPr id="3" name="Content Placeholder 2">
+            <a:extLst>
+              <a:ext uri="{FF2B5EF4-FFF2-40B4-BE49-F238E27FC236}">
+                <a16:creationId xmlns:a16="http://schemas.microsoft.com/office/drawing/2014/main" id="{13A9A3BF-349F-4338-A580-E0A9DDB5CA4E}"/>
+              </a:ext>
+            </a:extLst>
+          </p:cNvPr>
+          <p:cNvSpPr>
+            <a:spLocks noGrp="1"/>
+          </p:cNvSpPr>
+          <p:nvPr>
+            <p:ph idx="1"/>
+          </p:nvPr>
+        </p:nvSpPr>
+        <p:spPr/>
+        <p:txBody>
+          <a:bodyPr/>
+          <a:lstStyle/>
+          <a:p>
+            <a:r>
+              <a:rPr lang="en-IN" dirty="0"/>
+              <a:t>Data has been sourced from multiple areas</a:t>
+            </a:r>
+          </a:p>
+          <a:p>
+            <a:pPr lvl="1">
+              <a:buFont typeface="Wingdings" panose="05000000000000000000" pitchFamily="2" charset="2"/>
+              <a:buChar char="§"/>
+            </a:pPr>
+            <a:r>
+              <a:rPr lang="en-IN" i="0" dirty="0"/>
+              <a:t>Scrapping popular cricket websites</a:t>
+            </a:r>
+          </a:p>
+          <a:p>
+            <a:pPr lvl="1">
+              <a:buFont typeface="Wingdings" panose="05000000000000000000" pitchFamily="2" charset="2"/>
+              <a:buChar char="§"/>
+            </a:pPr>
+            <a:r>
+              <a:rPr lang="en-IN" i="0" dirty="0"/>
+              <a:t>Scrapping wiki </a:t>
+            </a:r>
+          </a:p>
+          <a:p>
+            <a:pPr lvl="1">
+              <a:buFont typeface="Wingdings" panose="05000000000000000000" pitchFamily="2" charset="2"/>
+              <a:buChar char="§"/>
+            </a:pPr>
+            <a:r>
+              <a:rPr lang="en-IN" i="0" dirty="0"/>
+              <a:t>Google API – Geo points</a:t>
+            </a:r>
+          </a:p>
+          <a:p>
+            <a:pPr lvl="1">
+              <a:buFont typeface="Wingdings" panose="05000000000000000000" pitchFamily="2" charset="2"/>
+              <a:buChar char="§"/>
+            </a:pPr>
+            <a:r>
+              <a:rPr lang="en-IN" i="0" dirty="0"/>
+              <a:t>Kaggle competitions</a:t>
+            </a:r>
+          </a:p>
+          <a:p>
+            <a:pPr lvl="1">
+              <a:buFont typeface="Wingdings" panose="05000000000000000000" pitchFamily="2" charset="2"/>
+              <a:buChar char="§"/>
+            </a:pPr>
+            <a:endParaRPr lang="en-IN" i="0" dirty="0"/>
+          </a:p>
+          <a:p>
+            <a:pPr>
+              <a:buFont typeface="Wingdings" panose="05000000000000000000" pitchFamily="2" charset="2"/>
+              <a:buChar char="§"/>
+            </a:pPr>
+            <a:r>
+              <a:rPr lang="en-IN" i="0" dirty="0"/>
+              <a:t>All the data is further stored into S3.</a:t>
+            </a:r>
+            <a:endParaRPr lang="en-IN" sz="3200" i="0" dirty="0"/>
+          </a:p>
+        </p:txBody>
+      </p:sp>
+    </p:spTree>
+    <p:extLst>
+      <p:ext uri="{BB962C8B-B14F-4D97-AF65-F5344CB8AC3E}">
+        <p14:creationId xmlns:p14="http://schemas.microsoft.com/office/powerpoint/2010/main" val="73114080"/>
+      </p:ext>
+    </p:extLst>
+  </p:cSld>
+  <p:clrMapOvr>
+    <a:masterClrMapping/>
+  </p:clrMapOvr>
+</p:sld>
+</file>
+
+<file path=ppt/slides/slide7.xml><?xml version="1.0" encoding="utf-8"?>
+<p:sld xmlns:a="http://schemas.openxmlformats.org/drawingml/2006/main" xmlns:r="http://schemas.openxmlformats.org/officeDocument/2006/relationships" xmlns:p="http://schemas.openxmlformats.org/presentationml/2006/main">
+  <p:cSld>
+    <p:spTree>
+      <p:nvGrpSpPr>
+        <p:cNvPr id="1" name=""/>
+        <p:cNvGrpSpPr/>
+        <p:nvPr/>
+      </p:nvGrpSpPr>
+      <p:grpSpPr>
+        <a:xfrm>
+          <a:off x="0" y="0"/>
+          <a:ext cx="0" cy="0"/>
+          <a:chOff x="0" y="0"/>
+          <a:chExt cx="0" cy="0"/>
+        </a:xfrm>
+      </p:grpSpPr>
+      <p:sp>
+        <p:nvSpPr>
+          <p:cNvPr id="2" name="Title 1">
+            <a:extLst>
+              <a:ext uri="{FF2B5EF4-FFF2-40B4-BE49-F238E27FC236}">
+                <a16:creationId xmlns:a16="http://schemas.microsoft.com/office/drawing/2014/main" id="{009A00EB-1AF1-4D7B-833A-778FFAB6B726}"/>
+              </a:ext>
+            </a:extLst>
+          </p:cNvPr>
+          <p:cNvSpPr>
+            <a:spLocks noGrp="1"/>
+          </p:cNvSpPr>
+          <p:nvPr>
+            <p:ph type="title"/>
+          </p:nvPr>
+        </p:nvSpPr>
+        <p:spPr>
+          <a:xfrm>
+            <a:off x="901817" y="1138806"/>
+            <a:ext cx="9601200" cy="1485900"/>
+          </a:xfrm>
+        </p:spPr>
+        <p:txBody>
+          <a:bodyPr/>
+          <a:lstStyle/>
+          <a:p>
+            <a:r>
+              <a:rPr lang="en-IN" dirty="0" err="1"/>
+              <a:t>Cont</a:t>
+            </a:r>
+            <a:r>
+              <a:rPr lang="en-IN" dirty="0"/>
+              <a:t>…</a:t>
+            </a:r>
+          </a:p>
+        </p:txBody>
+      </p:sp>
+      <p:sp>
+        <p:nvSpPr>
+          <p:cNvPr id="3" name="Content Placeholder 2">
+            <a:extLst>
+              <a:ext uri="{FF2B5EF4-FFF2-40B4-BE49-F238E27FC236}">
+                <a16:creationId xmlns:a16="http://schemas.microsoft.com/office/drawing/2014/main" id="{EF86AFE6-7885-4F91-ADDF-1EC015BD2323}"/>
+              </a:ext>
+            </a:extLst>
+          </p:cNvPr>
+          <p:cNvSpPr>
+            <a:spLocks noGrp="1"/>
+          </p:cNvSpPr>
+          <p:nvPr>
+            <p:ph idx="1"/>
+          </p:nvPr>
+        </p:nvSpPr>
+        <p:spPr>
+          <a:xfrm>
+            <a:off x="1295400" y="2789339"/>
+            <a:ext cx="9601200" cy="3581400"/>
+          </a:xfrm>
+        </p:spPr>
+        <p:txBody>
+          <a:bodyPr/>
+          <a:lstStyle/>
+          <a:p>
+            <a:r>
+              <a:rPr lang="en-IN" dirty="0"/>
+              <a:t>Raw data received in S3 is pushed into AWS DynamoDB.</a:t>
+            </a:r>
+          </a:p>
+          <a:p>
+            <a:r>
+              <a:rPr lang="en-IN" dirty="0"/>
+              <a:t>S3event invokes AWS Lambda which does the data parsing before it is rested in DynamoDB.</a:t>
+            </a:r>
+          </a:p>
+          <a:p>
+            <a:r>
+              <a:rPr lang="en-IN" dirty="0"/>
+              <a:t>Three tables – Player, Matches, Deliveries</a:t>
+            </a:r>
+          </a:p>
+          <a:p>
+            <a:r>
+              <a:rPr lang="en-IN" dirty="0"/>
+              <a:t>Data in DynamoDB acts a source of truth for all the further operations.</a:t>
+            </a:r>
+          </a:p>
+        </p:txBody>
+      </p:sp>
+    </p:spTree>
+    <p:extLst>
+      <p:ext uri="{BB962C8B-B14F-4D97-AF65-F5344CB8AC3E}">
+        <p14:creationId xmlns:p14="http://schemas.microsoft.com/office/powerpoint/2010/main" val="1709835958"/>
+      </p:ext>
+    </p:extLst>
+  </p:cSld>
+  <p:clrMapOvr>
+    <a:masterClrMapping/>
+  </p:clrMapOvr>
+</p:sld>
+</file>
+
+<file path=ppt/slides/slide8.xml><?xml version="1.0" encoding="utf-8"?>
+<p:sld xmlns:a="http://schemas.openxmlformats.org/drawingml/2006/main" xmlns:r="http://schemas.openxmlformats.org/officeDocument/2006/relationships" xmlns:p="http://schemas.openxmlformats.org/presentationml/2006/main">
+  <p:cSld>
+    <p:spTree>
+      <p:nvGrpSpPr>
+        <p:cNvPr id="1" name=""/>
+        <p:cNvGrpSpPr/>
+        <p:nvPr/>
+      </p:nvGrpSpPr>
+      <p:grpSpPr>
+        <a:xfrm>
+          <a:off x="0" y="0"/>
+          <a:ext cx="0" cy="0"/>
+          <a:chOff x="0" y="0"/>
+          <a:chExt cx="0" cy="0"/>
+        </a:xfrm>
+      </p:grpSpPr>
+      <p:sp>
+        <p:nvSpPr>
+          <p:cNvPr id="2" name="Title 1">
+            <a:extLst>
+              <a:ext uri="{FF2B5EF4-FFF2-40B4-BE49-F238E27FC236}">
+                <a16:creationId xmlns:a16="http://schemas.microsoft.com/office/drawing/2014/main" id="{167CCAD3-B4E2-44CB-8570-E1C9AB1DA20A}"/>
+              </a:ext>
+            </a:extLst>
+          </p:cNvPr>
+          <p:cNvSpPr>
+            <a:spLocks noGrp="1"/>
+          </p:cNvSpPr>
+          <p:nvPr>
+            <p:ph type="title"/>
+          </p:nvPr>
+        </p:nvSpPr>
+        <p:spPr/>
+        <p:txBody>
+          <a:bodyPr/>
+          <a:lstStyle/>
+          <a:p>
+            <a:pPr algn="ctr"/>
+            <a:r>
+              <a:rPr lang="en-IN" dirty="0"/>
+              <a:t>TRANSFORM</a:t>
+            </a:r>
+          </a:p>
+        </p:txBody>
+      </p:sp>
+      <p:sp>
+        <p:nvSpPr>
+          <p:cNvPr id="3" name="Content Placeholder 2">
+            <a:extLst>
+              <a:ext uri="{FF2B5EF4-FFF2-40B4-BE49-F238E27FC236}">
+                <a16:creationId xmlns:a16="http://schemas.microsoft.com/office/drawing/2014/main" id="{B1E2B426-AF13-4CD0-B4BE-01CF73418778}"/>
+              </a:ext>
+            </a:extLst>
+          </p:cNvPr>
+          <p:cNvSpPr>
+            <a:spLocks noGrp="1"/>
+          </p:cNvSpPr>
+          <p:nvPr>
+            <p:ph idx="1"/>
+          </p:nvPr>
+        </p:nvSpPr>
+        <p:spPr/>
+        <p:txBody>
+          <a:bodyPr/>
+          <a:lstStyle/>
+          <a:p>
+            <a:r>
+              <a:rPr lang="en-IN" dirty="0"/>
+              <a:t>All the semi parsed data should be transformed into a meaningful entity.</a:t>
+            </a:r>
+          </a:p>
+          <a:p>
+            <a:r>
+              <a:rPr lang="en-IN" dirty="0"/>
+              <a:t>Triggers on </a:t>
+            </a:r>
+            <a:r>
+              <a:rPr lang="en-IN" dirty="0" err="1"/>
+              <a:t>DynamoDb</a:t>
+            </a:r>
+            <a:r>
+              <a:rPr lang="en-IN" dirty="0"/>
+              <a:t> would invoke AWS Lambda whenever a new entry is added into </a:t>
+            </a:r>
+            <a:r>
+              <a:rPr lang="en-IN" dirty="0" err="1"/>
+              <a:t>DynamoDb</a:t>
+            </a:r>
+            <a:r>
+              <a:rPr lang="en-IN" dirty="0"/>
+              <a:t>.</a:t>
+            </a:r>
+          </a:p>
+          <a:p>
+            <a:r>
+              <a:rPr lang="en-IN" dirty="0"/>
+              <a:t>AWS Lambda tunes the data into a meaningful patterns  which are further loaded into </a:t>
+            </a:r>
+            <a:r>
+              <a:rPr lang="en-IN" dirty="0" err="1"/>
+              <a:t>elasticsearch</a:t>
+            </a:r>
+            <a:r>
+              <a:rPr lang="en-IN" dirty="0"/>
+              <a:t> cluster.</a:t>
+            </a:r>
+          </a:p>
+          <a:p>
+            <a:r>
+              <a:rPr lang="en-IN" dirty="0"/>
+              <a:t>Lambdas would fetch additional geo data from Google API</a:t>
+            </a:r>
+          </a:p>
+          <a:p>
+            <a:r>
+              <a:rPr lang="en-IN" dirty="0"/>
+              <a:t>Lambdas used Redis for a quick key-value mappings.</a:t>
+            </a:r>
+          </a:p>
+        </p:txBody>
+      </p:sp>
+    </p:spTree>
+    <p:extLst>
+      <p:ext uri="{BB962C8B-B14F-4D97-AF65-F5344CB8AC3E}">
+        <p14:creationId xmlns:p14="http://schemas.microsoft.com/office/powerpoint/2010/main" val="551207707"/>
+      </p:ext>
+    </p:extLst>
+  </p:cSld>
+  <p:clrMapOvr>
+    <a:masterClrMapping/>
+  </p:clrMapOvr>
+</p:sld>
+</file>
+
+<file path=ppt/slides/slide9.xml><?xml version="1.0" encoding="utf-8"?>
+<p:sld xmlns:a="http://schemas.openxmlformats.org/drawingml/2006/main" xmlns:r="http://schemas.openxmlformats.org/officeDocument/2006/relationships" xmlns:p="http://schemas.openxmlformats.org/presentationml/2006/main">
+  <p:cSld>
+    <p:spTree>
+      <p:nvGrpSpPr>
+        <p:cNvPr id="1" name=""/>
+        <p:cNvGrpSpPr/>
+        <p:nvPr/>
+      </p:nvGrpSpPr>
+      <p:grpSpPr>
+        <a:xfrm>
+          <a:off x="0" y="0"/>
+          <a:ext cx="0" cy="0"/>
+          <a:chOff x="0" y="0"/>
+          <a:chExt cx="0" cy="0"/>
+        </a:xfrm>
+      </p:grpSpPr>
+      <p:sp>
+        <p:nvSpPr>
+          <p:cNvPr id="2" name="Title 1">
+            <a:extLst>
+              <a:ext uri="{FF2B5EF4-FFF2-40B4-BE49-F238E27FC236}">
+                <a16:creationId xmlns:a16="http://schemas.microsoft.com/office/drawing/2014/main" id="{1DAB1538-C908-49EA-9826-BE02D3A50CEF}"/>
+              </a:ext>
+            </a:extLst>
+          </p:cNvPr>
+          <p:cNvSpPr>
+            <a:spLocks noGrp="1"/>
+          </p:cNvSpPr>
+          <p:nvPr>
+            <p:ph type="title"/>
+          </p:nvPr>
+        </p:nvSpPr>
+        <p:spPr/>
+        <p:txBody>
+          <a:bodyPr/>
+          <a:lstStyle/>
+          <a:p>
+            <a:pPr algn="ctr"/>
+            <a:r>
+              <a:rPr lang="en-IN" dirty="0"/>
+              <a:t>LOAD</a:t>
+            </a:r>
+          </a:p>
+        </p:txBody>
+      </p:sp>
+      <p:sp>
+        <p:nvSpPr>
+          <p:cNvPr id="3" name="Content Placeholder 2">
+            <a:extLst>
+              <a:ext uri="{FF2B5EF4-FFF2-40B4-BE49-F238E27FC236}">
+                <a16:creationId xmlns:a16="http://schemas.microsoft.com/office/drawing/2014/main" id="{53C25CD0-9231-4200-A029-D0EA02160C9C}"/>
+              </a:ext>
+            </a:extLst>
+          </p:cNvPr>
+          <p:cNvSpPr>
+            <a:spLocks noGrp="1"/>
+          </p:cNvSpPr>
+          <p:nvPr>
+            <p:ph idx="1"/>
+          </p:nvPr>
+        </p:nvSpPr>
+        <p:spPr/>
+        <p:txBody>
+          <a:bodyPr/>
+          <a:lstStyle/>
+          <a:p>
+            <a:r>
+              <a:rPr lang="en-IN" dirty="0"/>
+              <a:t>Elasticsearch indexes all the incoming data from lambdas.</a:t>
+            </a:r>
+          </a:p>
+          <a:p>
+            <a:r>
+              <a:rPr lang="en-IN" dirty="0"/>
+              <a:t>Data on </a:t>
+            </a:r>
+            <a:r>
+              <a:rPr lang="en-IN" dirty="0" err="1"/>
+              <a:t>elasticsearch</a:t>
+            </a:r>
+            <a:r>
+              <a:rPr lang="en-IN" dirty="0"/>
+              <a:t> is split on the nodes which are part of the cluster.</a:t>
+            </a:r>
+          </a:p>
+          <a:p>
+            <a:r>
+              <a:rPr lang="en-IN" dirty="0"/>
+              <a:t>All the three formats of the data are stored in different indices.</a:t>
+            </a:r>
+          </a:p>
+          <a:p>
+            <a:endParaRPr lang="en-IN" dirty="0"/>
+          </a:p>
+        </p:txBody>
+      </p:sp>
+    </p:spTree>
+    <p:extLst>
+      <p:ext uri="{BB962C8B-B14F-4D97-AF65-F5344CB8AC3E}">
+        <p14:creationId xmlns:p14="http://schemas.microsoft.com/office/powerpoint/2010/main" val="2460120753"/>
       </p:ext>
     </p:extLst>
   </p:cSld>

</xml_diff>